<commit_message>
Second version of presentation.
</commit_message>
<xml_diff>
--- a/Meeting.pptx
+++ b/Meeting.pptx
@@ -5,10 +5,10 @@
     <p:sldMasterId id="2147483660" r:id="rId1"/>
   </p:sldMasterIdLst>
   <p:notesMasterIdLst>
-    <p:notesMasterId r:id="rId19"/>
+    <p:notesMasterId r:id="rId25"/>
   </p:notesMasterIdLst>
   <p:handoutMasterIdLst>
-    <p:handoutMasterId r:id="rId20"/>
+    <p:handoutMasterId r:id="rId26"/>
   </p:handoutMasterIdLst>
   <p:sldIdLst>
     <p:sldId id="256" r:id="rId2"/>
@@ -16,18 +16,24 @@
     <p:sldId id="329" r:id="rId4"/>
     <p:sldId id="343" r:id="rId5"/>
     <p:sldId id="330" r:id="rId6"/>
-    <p:sldId id="332" r:id="rId7"/>
-    <p:sldId id="331" r:id="rId8"/>
-    <p:sldId id="333" r:id="rId9"/>
-    <p:sldId id="334" r:id="rId10"/>
-    <p:sldId id="335" r:id="rId11"/>
-    <p:sldId id="336" r:id="rId12"/>
-    <p:sldId id="337" r:id="rId13"/>
-    <p:sldId id="339" r:id="rId14"/>
-    <p:sldId id="338" r:id="rId15"/>
-    <p:sldId id="340" r:id="rId16"/>
-    <p:sldId id="341" r:id="rId17"/>
-    <p:sldId id="342" r:id="rId18"/>
+    <p:sldId id="331" r:id="rId7"/>
+    <p:sldId id="348" r:id="rId8"/>
+    <p:sldId id="332" r:id="rId9"/>
+    <p:sldId id="333" r:id="rId10"/>
+    <p:sldId id="349" r:id="rId11"/>
+    <p:sldId id="347" r:id="rId12"/>
+    <p:sldId id="344" r:id="rId13"/>
+    <p:sldId id="334" r:id="rId14"/>
+    <p:sldId id="335" r:id="rId15"/>
+    <p:sldId id="345" r:id="rId16"/>
+    <p:sldId id="336" r:id="rId17"/>
+    <p:sldId id="337" r:id="rId18"/>
+    <p:sldId id="339" r:id="rId19"/>
+    <p:sldId id="338" r:id="rId20"/>
+    <p:sldId id="340" r:id="rId21"/>
+    <p:sldId id="341" r:id="rId22"/>
+    <p:sldId id="342" r:id="rId23"/>
+    <p:sldId id="346" r:id="rId24"/>
   </p:sldIdLst>
   <p:sldSz cx="9144000" cy="6858000" type="screen4x3"/>
   <p:notesSz cx="6858000" cy="9144000"/>
@@ -212,7 +218,7 @@
             <a:fld id="{4180EC96-23B5-4301-8B91-BF70EABF146D}" type="datetimeFigureOut">
               <a:rPr lang="en-US" smtClean="0"/>
               <a:pPr/>
-              <a:t>2/15/2010</a:t>
+              <a:t>6/7/2010</a:t>
             </a:fld>
             <a:endParaRPr lang="en-US" dirty="0"/>
           </a:p>
@@ -286,6 +292,11 @@
         </p:txBody>
       </p:sp>
     </p:spTree>
+    <p:extLst>
+      <p:ext uri="{BB962C8B-B14F-4D97-AF65-F5344CB8AC3E}">
+        <p14:creationId xmlns:p14="http://schemas.microsoft.com/office/powerpoint/2010/main" val="3152423023"/>
+      </p:ext>
+    </p:extLst>
   </p:cSld>
   <p:clrMap bg1="lt1" tx1="dk1" bg2="lt2" tx2="dk2" accent1="accent1" accent2="accent2" accent3="accent3" accent4="accent4" accent5="accent5" accent6="accent6" hlink="hlink" folHlink="folHlink"/>
 </p:handoutMaster>
@@ -374,7 +385,7 @@
             <a:fld id="{7A94D76D-ACEA-4E66-9040-0707EFD59D28}" type="datetimeFigureOut">
               <a:rPr lang="en-US" smtClean="0"/>
               <a:pPr/>
-              <a:t>2/15/2010</a:t>
+              <a:t>6/7/2010</a:t>
             </a:fld>
             <a:endParaRPr lang="en-US"/>
           </a:p>
@@ -543,6 +554,11 @@
         </p:txBody>
       </p:sp>
     </p:spTree>
+    <p:extLst>
+      <p:ext uri="{BB962C8B-B14F-4D97-AF65-F5344CB8AC3E}">
+        <p14:creationId xmlns:p14="http://schemas.microsoft.com/office/powerpoint/2010/main" val="2794962940"/>
+      </p:ext>
+    </p:extLst>
   </p:cSld>
   <p:clrMap bg1="lt1" tx1="dk1" bg2="lt2" tx2="dk2" accent1="accent1" accent2="accent2" accent3="accent3" accent4="accent4" accent5="accent5" accent6="accent6" hlink="hlink" folHlink="folHlink"/>
   <p:notesStyle>
@@ -768,7 +784,7 @@
           </a:bodyPr>
           <a:lstStyle/>
           <a:p>
-            <a:endParaRPr lang="de-DE"/>
+            <a:endParaRPr lang="en-US"/>
           </a:p>
         </p:txBody>
       </p:sp>
@@ -932,7 +948,7 @@
           </a:bodyPr>
           <a:lstStyle/>
           <a:p>
-            <a:endParaRPr lang="de-DE"/>
+            <a:endParaRPr lang="en-US"/>
           </a:p>
         </p:txBody>
       </p:sp>
@@ -1096,7 +1112,7 @@
           </a:bodyPr>
           <a:lstStyle/>
           <a:p>
-            <a:endParaRPr lang="de-DE" dirty="0"/>
+            <a:endParaRPr lang="de-DE"/>
           </a:p>
         </p:txBody>
       </p:sp>
@@ -1178,7 +1194,7 @@
           </a:bodyPr>
           <a:lstStyle/>
           <a:p>
-            <a:endParaRPr lang="de-DE" dirty="0"/>
+            <a:endParaRPr lang="en-US"/>
           </a:p>
         </p:txBody>
       </p:sp>
@@ -1260,7 +1276,7 @@
           </a:bodyPr>
           <a:lstStyle/>
           <a:p>
-            <a:endParaRPr lang="de-DE" dirty="0"/>
+            <a:endParaRPr lang="de-DE"/>
           </a:p>
         </p:txBody>
       </p:sp>
@@ -1378,6 +1394,170 @@
 </p:notes>
 </file>
 
+<file path=ppt/notesSlides/notesSlide18.xml><?xml version="1.0" encoding="utf-8"?>
+<p:notes xmlns:a="http://schemas.openxmlformats.org/drawingml/2006/main" xmlns:r="http://schemas.openxmlformats.org/officeDocument/2006/relationships" xmlns:p="http://schemas.openxmlformats.org/presentationml/2006/main">
+  <p:cSld>
+    <p:spTree>
+      <p:nvGrpSpPr>
+        <p:cNvPr id="1" name=""/>
+        <p:cNvGrpSpPr/>
+        <p:nvPr/>
+      </p:nvGrpSpPr>
+      <p:grpSpPr>
+        <a:xfrm>
+          <a:off x="0" y="0"/>
+          <a:ext cx="0" cy="0"/>
+          <a:chOff x="0" y="0"/>
+          <a:chExt cx="0" cy="0"/>
+        </a:xfrm>
+      </p:grpSpPr>
+      <p:sp>
+        <p:nvSpPr>
+          <p:cNvPr id="2" name="Folienbildplatzhalter 1"/>
+          <p:cNvSpPr>
+            <a:spLocks noGrp="1" noRot="1" noChangeAspect="1"/>
+          </p:cNvSpPr>
+          <p:nvPr>
+            <p:ph type="sldImg"/>
+          </p:nvPr>
+        </p:nvSpPr>
+        <p:spPr/>
+      </p:sp>
+      <p:sp>
+        <p:nvSpPr>
+          <p:cNvPr id="3" name="Notizenplatzhalter 2"/>
+          <p:cNvSpPr>
+            <a:spLocks noGrp="1"/>
+          </p:cNvSpPr>
+          <p:nvPr>
+            <p:ph type="body" idx="1"/>
+          </p:nvPr>
+        </p:nvSpPr>
+        <p:spPr/>
+        <p:txBody>
+          <a:bodyPr>
+            <a:normAutofit/>
+          </a:bodyPr>
+          <a:lstStyle/>
+          <a:p>
+            <a:endParaRPr lang="de-DE"/>
+          </a:p>
+        </p:txBody>
+      </p:sp>
+      <p:sp>
+        <p:nvSpPr>
+          <p:cNvPr id="4" name="Foliennummernplatzhalter 3"/>
+          <p:cNvSpPr>
+            <a:spLocks noGrp="1"/>
+          </p:cNvSpPr>
+          <p:nvPr>
+            <p:ph type="sldNum" sz="quarter" idx="10"/>
+          </p:nvPr>
+        </p:nvSpPr>
+        <p:spPr/>
+        <p:txBody>
+          <a:bodyPr/>
+          <a:lstStyle/>
+          <a:p>
+            <a:fld id="{FE5C90B4-74E4-420E-9E3F-548EA925D0FC}" type="slidenum">
+              <a:rPr lang="en-US" smtClean="0"/>
+              <a:pPr/>
+              <a:t>18</a:t>
+            </a:fld>
+            <a:endParaRPr lang="en-US"/>
+          </a:p>
+        </p:txBody>
+      </p:sp>
+    </p:spTree>
+  </p:cSld>
+  <p:clrMapOvr>
+    <a:masterClrMapping/>
+  </p:clrMapOvr>
+</p:notes>
+</file>
+
+<file path=ppt/notesSlides/notesSlide19.xml><?xml version="1.0" encoding="utf-8"?>
+<p:notes xmlns:a="http://schemas.openxmlformats.org/drawingml/2006/main" xmlns:r="http://schemas.openxmlformats.org/officeDocument/2006/relationships" xmlns:p="http://schemas.openxmlformats.org/presentationml/2006/main">
+  <p:cSld>
+    <p:spTree>
+      <p:nvGrpSpPr>
+        <p:cNvPr id="1" name=""/>
+        <p:cNvGrpSpPr/>
+        <p:nvPr/>
+      </p:nvGrpSpPr>
+      <p:grpSpPr>
+        <a:xfrm>
+          <a:off x="0" y="0"/>
+          <a:ext cx="0" cy="0"/>
+          <a:chOff x="0" y="0"/>
+          <a:chExt cx="0" cy="0"/>
+        </a:xfrm>
+      </p:grpSpPr>
+      <p:sp>
+        <p:nvSpPr>
+          <p:cNvPr id="2" name="Folienbildplatzhalter 1"/>
+          <p:cNvSpPr>
+            <a:spLocks noGrp="1" noRot="1" noChangeAspect="1"/>
+          </p:cNvSpPr>
+          <p:nvPr>
+            <p:ph type="sldImg"/>
+          </p:nvPr>
+        </p:nvSpPr>
+        <p:spPr/>
+      </p:sp>
+      <p:sp>
+        <p:nvSpPr>
+          <p:cNvPr id="3" name="Notizenplatzhalter 2"/>
+          <p:cNvSpPr>
+            <a:spLocks noGrp="1"/>
+          </p:cNvSpPr>
+          <p:nvPr>
+            <p:ph type="body" idx="1"/>
+          </p:nvPr>
+        </p:nvSpPr>
+        <p:spPr/>
+        <p:txBody>
+          <a:bodyPr>
+            <a:normAutofit/>
+          </a:bodyPr>
+          <a:lstStyle/>
+          <a:p>
+            <a:endParaRPr lang="de-DE" dirty="0"/>
+          </a:p>
+        </p:txBody>
+      </p:sp>
+      <p:sp>
+        <p:nvSpPr>
+          <p:cNvPr id="4" name="Foliennummernplatzhalter 3"/>
+          <p:cNvSpPr>
+            <a:spLocks noGrp="1"/>
+          </p:cNvSpPr>
+          <p:nvPr>
+            <p:ph type="sldNum" sz="quarter" idx="10"/>
+          </p:nvPr>
+        </p:nvSpPr>
+        <p:spPr/>
+        <p:txBody>
+          <a:bodyPr/>
+          <a:lstStyle/>
+          <a:p>
+            <a:fld id="{FE5C90B4-74E4-420E-9E3F-548EA925D0FC}" type="slidenum">
+              <a:rPr lang="en-US" smtClean="0"/>
+              <a:pPr/>
+              <a:t>19</a:t>
+            </a:fld>
+            <a:endParaRPr lang="en-US"/>
+          </a:p>
+        </p:txBody>
+      </p:sp>
+    </p:spTree>
+  </p:cSld>
+  <p:clrMapOvr>
+    <a:masterClrMapping/>
+  </p:clrMapOvr>
+</p:notes>
+</file>
+
 <file path=ppt/notesSlides/notesSlide2.xml><?xml version="1.0" encoding="utf-8"?>
 <p:notes xmlns:a="http://schemas.openxmlformats.org/drawingml/2006/main" xmlns:r="http://schemas.openxmlformats.org/officeDocument/2006/relationships" xmlns:p="http://schemas.openxmlformats.org/presentationml/2006/main">
   <p:cSld>
@@ -1447,6 +1627,334 @@
               <a:rPr lang="en-US" smtClean="0"/>
               <a:pPr/>
               <a:t>2</a:t>
+            </a:fld>
+            <a:endParaRPr lang="en-US"/>
+          </a:p>
+        </p:txBody>
+      </p:sp>
+    </p:spTree>
+  </p:cSld>
+  <p:clrMapOvr>
+    <a:masterClrMapping/>
+  </p:clrMapOvr>
+</p:notes>
+</file>
+
+<file path=ppt/notesSlides/notesSlide20.xml><?xml version="1.0" encoding="utf-8"?>
+<p:notes xmlns:a="http://schemas.openxmlformats.org/drawingml/2006/main" xmlns:r="http://schemas.openxmlformats.org/officeDocument/2006/relationships" xmlns:p="http://schemas.openxmlformats.org/presentationml/2006/main">
+  <p:cSld>
+    <p:spTree>
+      <p:nvGrpSpPr>
+        <p:cNvPr id="1" name=""/>
+        <p:cNvGrpSpPr/>
+        <p:nvPr/>
+      </p:nvGrpSpPr>
+      <p:grpSpPr>
+        <a:xfrm>
+          <a:off x="0" y="0"/>
+          <a:ext cx="0" cy="0"/>
+          <a:chOff x="0" y="0"/>
+          <a:chExt cx="0" cy="0"/>
+        </a:xfrm>
+      </p:grpSpPr>
+      <p:sp>
+        <p:nvSpPr>
+          <p:cNvPr id="2" name="Folienbildplatzhalter 1"/>
+          <p:cNvSpPr>
+            <a:spLocks noGrp="1" noRot="1" noChangeAspect="1"/>
+          </p:cNvSpPr>
+          <p:nvPr>
+            <p:ph type="sldImg"/>
+          </p:nvPr>
+        </p:nvSpPr>
+        <p:spPr/>
+      </p:sp>
+      <p:sp>
+        <p:nvSpPr>
+          <p:cNvPr id="3" name="Notizenplatzhalter 2"/>
+          <p:cNvSpPr>
+            <a:spLocks noGrp="1"/>
+          </p:cNvSpPr>
+          <p:nvPr>
+            <p:ph type="body" idx="1"/>
+          </p:nvPr>
+        </p:nvSpPr>
+        <p:spPr/>
+        <p:txBody>
+          <a:bodyPr>
+            <a:normAutofit/>
+          </a:bodyPr>
+          <a:lstStyle/>
+          <a:p>
+            <a:endParaRPr lang="de-DE" dirty="0"/>
+          </a:p>
+        </p:txBody>
+      </p:sp>
+      <p:sp>
+        <p:nvSpPr>
+          <p:cNvPr id="4" name="Foliennummernplatzhalter 3"/>
+          <p:cNvSpPr>
+            <a:spLocks noGrp="1"/>
+          </p:cNvSpPr>
+          <p:nvPr>
+            <p:ph type="sldNum" sz="quarter" idx="10"/>
+          </p:nvPr>
+        </p:nvSpPr>
+        <p:spPr/>
+        <p:txBody>
+          <a:bodyPr/>
+          <a:lstStyle/>
+          <a:p>
+            <a:fld id="{FE5C90B4-74E4-420E-9E3F-548EA925D0FC}" type="slidenum">
+              <a:rPr lang="en-US" smtClean="0"/>
+              <a:pPr/>
+              <a:t>20</a:t>
+            </a:fld>
+            <a:endParaRPr lang="en-US"/>
+          </a:p>
+        </p:txBody>
+      </p:sp>
+    </p:spTree>
+  </p:cSld>
+  <p:clrMapOvr>
+    <a:masterClrMapping/>
+  </p:clrMapOvr>
+</p:notes>
+</file>
+
+<file path=ppt/notesSlides/notesSlide21.xml><?xml version="1.0" encoding="utf-8"?>
+<p:notes xmlns:a="http://schemas.openxmlformats.org/drawingml/2006/main" xmlns:r="http://schemas.openxmlformats.org/officeDocument/2006/relationships" xmlns:p="http://schemas.openxmlformats.org/presentationml/2006/main">
+  <p:cSld>
+    <p:spTree>
+      <p:nvGrpSpPr>
+        <p:cNvPr id="1" name=""/>
+        <p:cNvGrpSpPr/>
+        <p:nvPr/>
+      </p:nvGrpSpPr>
+      <p:grpSpPr>
+        <a:xfrm>
+          <a:off x="0" y="0"/>
+          <a:ext cx="0" cy="0"/>
+          <a:chOff x="0" y="0"/>
+          <a:chExt cx="0" cy="0"/>
+        </a:xfrm>
+      </p:grpSpPr>
+      <p:sp>
+        <p:nvSpPr>
+          <p:cNvPr id="2" name="Folienbildplatzhalter 1"/>
+          <p:cNvSpPr>
+            <a:spLocks noGrp="1" noRot="1" noChangeAspect="1"/>
+          </p:cNvSpPr>
+          <p:nvPr>
+            <p:ph type="sldImg"/>
+          </p:nvPr>
+        </p:nvSpPr>
+        <p:spPr/>
+      </p:sp>
+      <p:sp>
+        <p:nvSpPr>
+          <p:cNvPr id="3" name="Notizenplatzhalter 2"/>
+          <p:cNvSpPr>
+            <a:spLocks noGrp="1"/>
+          </p:cNvSpPr>
+          <p:nvPr>
+            <p:ph type="body" idx="1"/>
+          </p:nvPr>
+        </p:nvSpPr>
+        <p:spPr/>
+        <p:txBody>
+          <a:bodyPr>
+            <a:normAutofit/>
+          </a:bodyPr>
+          <a:lstStyle/>
+          <a:p>
+            <a:endParaRPr lang="de-DE" dirty="0"/>
+          </a:p>
+        </p:txBody>
+      </p:sp>
+      <p:sp>
+        <p:nvSpPr>
+          <p:cNvPr id="4" name="Foliennummernplatzhalter 3"/>
+          <p:cNvSpPr>
+            <a:spLocks noGrp="1"/>
+          </p:cNvSpPr>
+          <p:nvPr>
+            <p:ph type="sldNum" sz="quarter" idx="10"/>
+          </p:nvPr>
+        </p:nvSpPr>
+        <p:spPr/>
+        <p:txBody>
+          <a:bodyPr/>
+          <a:lstStyle/>
+          <a:p>
+            <a:fld id="{FE5C90B4-74E4-420E-9E3F-548EA925D0FC}" type="slidenum">
+              <a:rPr lang="en-US" smtClean="0"/>
+              <a:pPr/>
+              <a:t>21</a:t>
+            </a:fld>
+            <a:endParaRPr lang="en-US"/>
+          </a:p>
+        </p:txBody>
+      </p:sp>
+    </p:spTree>
+  </p:cSld>
+  <p:clrMapOvr>
+    <a:masterClrMapping/>
+  </p:clrMapOvr>
+</p:notes>
+</file>
+
+<file path=ppt/notesSlides/notesSlide22.xml><?xml version="1.0" encoding="utf-8"?>
+<p:notes xmlns:a="http://schemas.openxmlformats.org/drawingml/2006/main" xmlns:r="http://schemas.openxmlformats.org/officeDocument/2006/relationships" xmlns:p="http://schemas.openxmlformats.org/presentationml/2006/main">
+  <p:cSld>
+    <p:spTree>
+      <p:nvGrpSpPr>
+        <p:cNvPr id="1" name=""/>
+        <p:cNvGrpSpPr/>
+        <p:nvPr/>
+      </p:nvGrpSpPr>
+      <p:grpSpPr>
+        <a:xfrm>
+          <a:off x="0" y="0"/>
+          <a:ext cx="0" cy="0"/>
+          <a:chOff x="0" y="0"/>
+          <a:chExt cx="0" cy="0"/>
+        </a:xfrm>
+      </p:grpSpPr>
+      <p:sp>
+        <p:nvSpPr>
+          <p:cNvPr id="2" name="Folienbildplatzhalter 1"/>
+          <p:cNvSpPr>
+            <a:spLocks noGrp="1" noRot="1" noChangeAspect="1"/>
+          </p:cNvSpPr>
+          <p:nvPr>
+            <p:ph type="sldImg"/>
+          </p:nvPr>
+        </p:nvSpPr>
+        <p:spPr/>
+      </p:sp>
+      <p:sp>
+        <p:nvSpPr>
+          <p:cNvPr id="3" name="Notizenplatzhalter 2"/>
+          <p:cNvSpPr>
+            <a:spLocks noGrp="1"/>
+          </p:cNvSpPr>
+          <p:nvPr>
+            <p:ph type="body" idx="1"/>
+          </p:nvPr>
+        </p:nvSpPr>
+        <p:spPr/>
+        <p:txBody>
+          <a:bodyPr>
+            <a:normAutofit/>
+          </a:bodyPr>
+          <a:lstStyle/>
+          <a:p>
+            <a:endParaRPr lang="de-DE" dirty="0"/>
+          </a:p>
+        </p:txBody>
+      </p:sp>
+      <p:sp>
+        <p:nvSpPr>
+          <p:cNvPr id="4" name="Foliennummernplatzhalter 3"/>
+          <p:cNvSpPr>
+            <a:spLocks noGrp="1"/>
+          </p:cNvSpPr>
+          <p:nvPr>
+            <p:ph type="sldNum" sz="quarter" idx="10"/>
+          </p:nvPr>
+        </p:nvSpPr>
+        <p:spPr/>
+        <p:txBody>
+          <a:bodyPr/>
+          <a:lstStyle/>
+          <a:p>
+            <a:fld id="{FE5C90B4-74E4-420E-9E3F-548EA925D0FC}" type="slidenum">
+              <a:rPr lang="en-US" smtClean="0"/>
+              <a:pPr/>
+              <a:t>22</a:t>
+            </a:fld>
+            <a:endParaRPr lang="en-US"/>
+          </a:p>
+        </p:txBody>
+      </p:sp>
+    </p:spTree>
+  </p:cSld>
+  <p:clrMapOvr>
+    <a:masterClrMapping/>
+  </p:clrMapOvr>
+</p:notes>
+</file>
+
+<file path=ppt/notesSlides/notesSlide23.xml><?xml version="1.0" encoding="utf-8"?>
+<p:notes xmlns:a="http://schemas.openxmlformats.org/drawingml/2006/main" xmlns:r="http://schemas.openxmlformats.org/officeDocument/2006/relationships" xmlns:p="http://schemas.openxmlformats.org/presentationml/2006/main">
+  <p:cSld>
+    <p:spTree>
+      <p:nvGrpSpPr>
+        <p:cNvPr id="1" name=""/>
+        <p:cNvGrpSpPr/>
+        <p:nvPr/>
+      </p:nvGrpSpPr>
+      <p:grpSpPr>
+        <a:xfrm>
+          <a:off x="0" y="0"/>
+          <a:ext cx="0" cy="0"/>
+          <a:chOff x="0" y="0"/>
+          <a:chExt cx="0" cy="0"/>
+        </a:xfrm>
+      </p:grpSpPr>
+      <p:sp>
+        <p:nvSpPr>
+          <p:cNvPr id="2" name="Folienbildplatzhalter 1"/>
+          <p:cNvSpPr>
+            <a:spLocks noGrp="1" noRot="1" noChangeAspect="1"/>
+          </p:cNvSpPr>
+          <p:nvPr>
+            <p:ph type="sldImg"/>
+          </p:nvPr>
+        </p:nvSpPr>
+        <p:spPr/>
+      </p:sp>
+      <p:sp>
+        <p:nvSpPr>
+          <p:cNvPr id="3" name="Notizenplatzhalter 2"/>
+          <p:cNvSpPr>
+            <a:spLocks noGrp="1"/>
+          </p:cNvSpPr>
+          <p:nvPr>
+            <p:ph type="body" idx="1"/>
+          </p:nvPr>
+        </p:nvSpPr>
+        <p:spPr/>
+        <p:txBody>
+          <a:bodyPr>
+            <a:normAutofit/>
+          </a:bodyPr>
+          <a:lstStyle/>
+          <a:p>
+            <a:endParaRPr lang="en-US"/>
+          </a:p>
+        </p:txBody>
+      </p:sp>
+      <p:sp>
+        <p:nvSpPr>
+          <p:cNvPr id="4" name="Foliennummernplatzhalter 3"/>
+          <p:cNvSpPr>
+            <a:spLocks noGrp="1"/>
+          </p:cNvSpPr>
+          <p:nvPr>
+            <p:ph type="sldNum" sz="quarter" idx="10"/>
+          </p:nvPr>
+        </p:nvSpPr>
+        <p:spPr/>
+        <p:txBody>
+          <a:bodyPr/>
+          <a:lstStyle/>
+          <a:p>
+            <a:fld id="{FE5C90B4-74E4-420E-9E3F-548EA925D0FC}" type="slidenum">
+              <a:rPr lang="en-US" smtClean="0"/>
+              <a:pPr/>
+              <a:t>23</a:t>
             </a:fld>
             <a:endParaRPr lang="en-US"/>
           </a:p>
@@ -1834,7 +2342,7 @@
           </a:bodyPr>
           <a:lstStyle/>
           <a:p>
-            <a:endParaRPr lang="de-DE"/>
+            <a:endParaRPr lang="en-US"/>
           </a:p>
         </p:txBody>
       </p:sp>
@@ -4214,7 +4722,7 @@
             <a:fld id="{75429ADD-C5BF-4814-8EAF-17BB58E1B0D2}" type="datetimeFigureOut">
               <a:rPr lang="en-US" smtClean="0"/>
               <a:pPr/>
-              <a:t>2/15/2010</a:t>
+              <a:t>6/7/2010</a:t>
             </a:fld>
             <a:endParaRPr lang="en-US" dirty="0"/>
           </a:p>
@@ -5010,7 +5518,7 @@
         <p:spPr bwMode="auto">
           <a:xfrm>
             <a:off x="381000" y="4419600"/>
-            <a:ext cx="5553075" cy="2286000"/>
+            <a:ext cx="7746395" cy="2286000"/>
           </a:xfrm>
           <a:prstGeom prst="rect">
             <a:avLst/>
@@ -5036,8 +5544,17 @@
               <a:rPr lang="en-US" sz="2800" b="1" dirty="0" smtClean="0">
                 <a:latin typeface="Calibri" pitchFamily="34" charset="0"/>
               </a:rPr>
-              <a:t>Steffen Forkmann</a:t>
-            </a:r>
+              <a:t>Steffen </a:t>
+            </a:r>
+            <a:r>
+              <a:rPr lang="en-US" sz="2800" b="1" dirty="0" smtClean="0">
+                <a:latin typeface="Calibri" pitchFamily="34" charset="0"/>
+              </a:rPr>
+              <a:t>Forkmann – Hamburg / Germany</a:t>
+            </a:r>
+            <a:endParaRPr lang="en-US" sz="2800" b="1" dirty="0" smtClean="0">
+              <a:latin typeface="Calibri" pitchFamily="34" charset="0"/>
+            </a:endParaRPr>
           </a:p>
           <a:p>
             <a:pPr marL="342900" indent="-342900" algn="l" rtl="0">
@@ -5055,14 +5572,17 @@
               <a:rPr lang="en-US" sz="2800" b="1" dirty="0" smtClean="0">
                 <a:latin typeface="Calibri" pitchFamily="34" charset="0"/>
               </a:rPr>
-              <a:t> </a:t>
+              <a:t> solutions </a:t>
             </a:r>
             <a:r>
               <a:rPr lang="en-US" sz="2800" b="1" dirty="0" smtClean="0">
                 <a:latin typeface="Calibri" pitchFamily="34" charset="0"/>
               </a:rPr>
-              <a:t>solutions GmbH</a:t>
-            </a:r>
+              <a:t>GmbH – Halle / Germany</a:t>
+            </a:r>
+            <a:endParaRPr lang="en-US" sz="2800" b="1" dirty="0" smtClean="0">
+              <a:latin typeface="Calibri" pitchFamily="34" charset="0"/>
+            </a:endParaRPr>
           </a:p>
           <a:p>
             <a:pPr marL="342900" indent="-342900" algn="l" rtl="0">
@@ -5109,14 +5629,7 @@
                 <a:latin typeface="Calibri" pitchFamily="34" charset="0"/>
                 <a:hlinkClick r:id="rId5"/>
               </a:rPr>
-              <a:t>http://</a:t>
-            </a:r>
-            <a:r>
-              <a:rPr lang="en-US" sz="2800" dirty="0" smtClean="0">
-                <a:latin typeface="Calibri" pitchFamily="34" charset="0"/>
-                <a:hlinkClick r:id="rId5"/>
-              </a:rPr>
-              <a:t>github.com/forki/</a:t>
+              <a:t>http://github.com/forki/</a:t>
             </a:r>
             <a:endParaRPr lang="en-US" sz="2800" dirty="0" smtClean="0">
               <a:latin typeface="Calibri" pitchFamily="34" charset="0"/>
@@ -5324,26 +5837,7 @@
                 <a:ea typeface="+mj-ea"/>
                 <a:cs typeface="+mj-cs"/>
               </a:rPr>
-              <a:t>Open source tools </a:t>
-            </a:r>
-            <a:r>
-              <a:rPr kumimoji="0" lang="en-US" sz="5400" b="1" i="0" u="none" strike="noStrike" kern="1200" cap="none" spc="0" normalizeH="0" baseline="0" noProof="0" dirty="0" smtClean="0">
-                <a:ln>
-                  <a:noFill/>
-                </a:ln>
-                <a:solidFill>
-                  <a:schemeClr val="accent1">
-                    <a:satMod val="150000"/>
-                  </a:schemeClr>
-                </a:solidFill>
-                <a:effectLst/>
-                <a:uLnTx/>
-                <a:uFillTx/>
-                <a:latin typeface="+mj-lt"/>
-                <a:ea typeface="+mj-ea"/>
-                <a:cs typeface="+mj-cs"/>
-              </a:rPr>
-              <a:t>in F#</a:t>
+              <a:t>Open source tools in F#</a:t>
             </a:r>
             <a:endParaRPr kumimoji="0" lang="en-US" sz="4700" b="1" i="0" u="none" strike="noStrike" kern="1200" cap="none" spc="0" normalizeH="0" baseline="0" noProof="0" dirty="0">
               <a:ln>
@@ -5412,6 +5906,976 @@
           <a:lstStyle/>
           <a:p>
             <a:r>
+              <a:rPr lang="en-US" dirty="0" smtClean="0"/>
+              <a:t>Demo</a:t>
+            </a:r>
+            <a:endParaRPr lang="en-US" dirty="0"/>
+          </a:p>
+        </p:txBody>
+      </p:sp>
+      <p:sp>
+        <p:nvSpPr>
+          <p:cNvPr id="3" name="Inhaltsplatzhalter 2"/>
+          <p:cNvSpPr>
+            <a:spLocks noGrp="1"/>
+          </p:cNvSpPr>
+          <p:nvPr>
+            <p:ph idx="1"/>
+          </p:nvPr>
+        </p:nvSpPr>
+        <p:spPr/>
+        <p:txBody>
+          <a:bodyPr/>
+          <a:lstStyle/>
+          <a:p>
+            <a:r>
+              <a:rPr lang="en-US" dirty="0" err="1" smtClean="0"/>
+              <a:t>FooBar</a:t>
+            </a:r>
+            <a:r>
+              <a:rPr lang="en-US" dirty="0" smtClean="0"/>
+              <a:t> sample 2</a:t>
+            </a:r>
+            <a:endParaRPr lang="en-US" dirty="0" smtClean="0"/>
+          </a:p>
+        </p:txBody>
+      </p:sp>
+    </p:spTree>
+    <p:extLst>
+      <p:ext uri="{BB962C8B-B14F-4D97-AF65-F5344CB8AC3E}">
+        <p14:creationId xmlns:p14="http://schemas.microsoft.com/office/powerpoint/2010/main" val="741407412"/>
+      </p:ext>
+    </p:extLst>
+  </p:cSld>
+  <p:clrMapOvr>
+    <a:masterClrMapping/>
+  </p:clrMapOvr>
+  <p:timing>
+    <p:tnLst>
+      <p:par>
+        <p:cTn id="1" dur="indefinite" restart="never" nodeType="tmRoot"/>
+      </p:par>
+    </p:tnLst>
+  </p:timing>
+</p:sld>
+</file>
+
+<file path=ppt/slides/slide11.xml><?xml version="1.0" encoding="utf-8"?>
+<p:sld xmlns:a="http://schemas.openxmlformats.org/drawingml/2006/main" xmlns:r="http://schemas.openxmlformats.org/officeDocument/2006/relationships" xmlns:p="http://schemas.openxmlformats.org/presentationml/2006/main">
+  <p:cSld>
+    <p:spTree>
+      <p:nvGrpSpPr>
+        <p:cNvPr id="1" name=""/>
+        <p:cNvGrpSpPr/>
+        <p:nvPr/>
+      </p:nvGrpSpPr>
+      <p:grpSpPr>
+        <a:xfrm>
+          <a:off x="0" y="0"/>
+          <a:ext cx="0" cy="0"/>
+          <a:chOff x="0" y="0"/>
+          <a:chExt cx="0" cy="0"/>
+        </a:xfrm>
+      </p:grpSpPr>
+      <p:sp>
+        <p:nvSpPr>
+          <p:cNvPr id="2" name="Titel 1"/>
+          <p:cNvSpPr>
+            <a:spLocks noGrp="1"/>
+          </p:cNvSpPr>
+          <p:nvPr>
+            <p:ph type="title"/>
+          </p:nvPr>
+        </p:nvSpPr>
+        <p:spPr/>
+        <p:txBody>
+          <a:bodyPr/>
+          <a:lstStyle/>
+          <a:p>
+            <a:r>
+              <a:rPr lang="de-DE" dirty="0" smtClean="0"/>
+              <a:t>Setting </a:t>
+            </a:r>
+            <a:r>
+              <a:rPr lang="de-DE" dirty="0" err="1" smtClean="0"/>
+              <a:t>params</a:t>
+            </a:r>
+            <a:r>
+              <a:rPr lang="de-DE" dirty="0" smtClean="0"/>
+              <a:t> </a:t>
+            </a:r>
+            <a:r>
+              <a:rPr lang="de-DE" dirty="0" err="1" smtClean="0"/>
+              <a:t>with</a:t>
+            </a:r>
+            <a:r>
+              <a:rPr lang="de-DE" dirty="0" smtClean="0"/>
+              <a:t> </a:t>
+            </a:r>
+            <a:r>
+              <a:rPr lang="de-DE" dirty="0"/>
+              <a:t>L</a:t>
+            </a:r>
+            <a:r>
+              <a:rPr lang="de-DE" dirty="0" smtClean="0"/>
+              <a:t>ambdas</a:t>
+            </a:r>
+            <a:endParaRPr lang="de-DE" dirty="0"/>
+          </a:p>
+        </p:txBody>
+      </p:sp>
+      <p:sp>
+        <p:nvSpPr>
+          <p:cNvPr id="3" name="Inhaltsplatzhalter 2"/>
+          <p:cNvSpPr>
+            <a:spLocks noGrp="1"/>
+          </p:cNvSpPr>
+          <p:nvPr>
+            <p:ph idx="1"/>
+          </p:nvPr>
+        </p:nvSpPr>
+        <p:spPr/>
+        <p:txBody>
+          <a:bodyPr>
+            <a:normAutofit/>
+          </a:bodyPr>
+          <a:lstStyle/>
+          <a:p>
+            <a:pPr>
+              <a:buNone/>
+            </a:pPr>
+            <a:r>
+              <a:rPr lang="en-US" sz="4000" dirty="0"/>
+              <a:t> </a:t>
+            </a:r>
+            <a:r>
+              <a:rPr lang="en-US" sz="4000" dirty="0" err="1"/>
+              <a:t>NUnit</a:t>
+            </a:r>
+            <a:r>
+              <a:rPr lang="en-US" sz="4000" dirty="0"/>
+              <a:t> (fun p -&gt; </a:t>
+            </a:r>
+          </a:p>
+          <a:p>
+            <a:pPr>
+              <a:buNone/>
+            </a:pPr>
+            <a:r>
+              <a:rPr lang="en-US" sz="4000" dirty="0"/>
+              <a:t>            {p with </a:t>
+            </a:r>
+          </a:p>
+          <a:p>
+            <a:pPr>
+              <a:buNone/>
+            </a:pPr>
+            <a:r>
+              <a:rPr lang="en-US" sz="4000" dirty="0"/>
+              <a:t>               </a:t>
+            </a:r>
+            <a:r>
+              <a:rPr lang="en-US" sz="4000" dirty="0" err="1"/>
+              <a:t>ToolPath</a:t>
+            </a:r>
+            <a:r>
+              <a:rPr lang="en-US" sz="4000" dirty="0"/>
+              <a:t> = </a:t>
+            </a:r>
+            <a:r>
+              <a:rPr lang="en-US" sz="4000" dirty="0" err="1"/>
+              <a:t>nunitPath</a:t>
+            </a:r>
+            <a:r>
+              <a:rPr lang="en-US" sz="4000" dirty="0"/>
+              <a:t>; </a:t>
+            </a:r>
+          </a:p>
+          <a:p>
+            <a:pPr>
+              <a:buNone/>
+            </a:pPr>
+            <a:r>
+              <a:rPr lang="en-US" sz="4000" dirty="0"/>
+              <a:t>               </a:t>
+            </a:r>
+            <a:r>
+              <a:rPr lang="en-US" sz="4000" dirty="0" err="1"/>
+              <a:t>DisableShadowCopy</a:t>
+            </a:r>
+            <a:r>
+              <a:rPr lang="en-US" sz="4000" dirty="0"/>
+              <a:t> = true; </a:t>
+            </a:r>
+          </a:p>
+          <a:p>
+            <a:pPr>
+              <a:buNone/>
+            </a:pPr>
+            <a:r>
+              <a:rPr lang="en-US" sz="4000" dirty="0"/>
+              <a:t>               </a:t>
+            </a:r>
+            <a:r>
+              <a:rPr lang="en-US" sz="4000" dirty="0" err="1"/>
+              <a:t>OutputFile</a:t>
+            </a:r>
+            <a:r>
+              <a:rPr lang="en-US" sz="4000" dirty="0"/>
+              <a:t> = output}) </a:t>
+            </a:r>
+            <a:endParaRPr lang="en-US" sz="4000" dirty="0" smtClean="0"/>
+          </a:p>
+        </p:txBody>
+      </p:sp>
+      <p:sp>
+        <p:nvSpPr>
+          <p:cNvPr id="4" name="Textfeld 3"/>
+          <p:cNvSpPr txBox="1"/>
+          <p:nvPr/>
+        </p:nvSpPr>
+        <p:spPr>
+          <a:xfrm>
+            <a:off x="4258882" y="2628202"/>
+            <a:ext cx="2025225" cy="369332"/>
+          </a:xfrm>
+          <a:prstGeom prst="rect">
+            <a:avLst/>
+          </a:prstGeom>
+        </p:spPr>
+        <p:style>
+          <a:lnRef idx="1">
+            <a:schemeClr val="accent1"/>
+          </a:lnRef>
+          <a:fillRef idx="2">
+            <a:schemeClr val="accent1"/>
+          </a:fillRef>
+          <a:effectRef idx="1">
+            <a:schemeClr val="accent1"/>
+          </a:effectRef>
+          <a:fontRef idx="minor">
+            <a:schemeClr val="dk1"/>
+          </a:fontRef>
+        </p:style>
+        <p:txBody>
+          <a:bodyPr wrap="square" rtlCol="0">
+            <a:spAutoFit/>
+          </a:bodyPr>
+          <a:lstStyle/>
+          <a:p>
+            <a:r>
+              <a:rPr lang="de-DE" dirty="0" err="1" smtClean="0"/>
+              <a:t>Overwrite</a:t>
+            </a:r>
+            <a:r>
+              <a:rPr lang="de-DE" dirty="0" smtClean="0"/>
+              <a:t> </a:t>
+            </a:r>
+            <a:r>
+              <a:rPr lang="de-DE" dirty="0" err="1" smtClean="0"/>
+              <a:t>default</a:t>
+            </a:r>
+            <a:r>
+              <a:rPr lang="de-DE" dirty="0" err="1"/>
+              <a:t>s</a:t>
+            </a:r>
+            <a:endParaRPr lang="de-DE" dirty="0"/>
+          </a:p>
+        </p:txBody>
+      </p:sp>
+    </p:spTree>
+    <p:extLst>
+      <p:ext uri="{BB962C8B-B14F-4D97-AF65-F5344CB8AC3E}">
+        <p14:creationId xmlns:p14="http://schemas.microsoft.com/office/powerpoint/2010/main" val="2490291346"/>
+      </p:ext>
+    </p:extLst>
+  </p:cSld>
+  <p:clrMapOvr>
+    <a:masterClrMapping/>
+  </p:clrMapOvr>
+  <p:timing>
+    <p:tnLst>
+      <p:par>
+        <p:cTn id="1" dur="indefinite" restart="never" nodeType="tmRoot">
+          <p:childTnLst>
+            <p:seq concurrent="1" nextAc="seek">
+              <p:cTn id="2" dur="indefinite" nodeType="mainSeq">
+                <p:childTnLst>
+                  <p:par>
+                    <p:cTn id="3" fill="hold">
+                      <p:stCondLst>
+                        <p:cond delay="indefinite"/>
+                      </p:stCondLst>
+                      <p:childTnLst>
+                        <p:par>
+                          <p:cTn id="4" fill="hold">
+                            <p:stCondLst>
+                              <p:cond delay="0"/>
+                            </p:stCondLst>
+                            <p:childTnLst>
+                              <p:par>
+                                <p:cTn id="5" presetID="3" presetClass="entr" presetSubtype="10" fill="hold" grpId="0" nodeType="clickEffect">
+                                  <p:stCondLst>
+                                    <p:cond delay="0"/>
+                                  </p:stCondLst>
+                                  <p:childTnLst>
+                                    <p:set>
+                                      <p:cBhvr>
+                                        <p:cTn id="6" dur="1" fill="hold">
+                                          <p:stCondLst>
+                                            <p:cond delay="0"/>
+                                          </p:stCondLst>
+                                        </p:cTn>
+                                        <p:tgtEl>
+                                          <p:spTgt spid="4"/>
+                                        </p:tgtEl>
+                                        <p:attrNameLst>
+                                          <p:attrName>style.visibility</p:attrName>
+                                        </p:attrNameLst>
+                                      </p:cBhvr>
+                                      <p:to>
+                                        <p:strVal val="visible"/>
+                                      </p:to>
+                                    </p:set>
+                                    <p:animEffect transition="in" filter="blinds(horizontal)">
+                                      <p:cBhvr>
+                                        <p:cTn id="7" dur="500"/>
+                                        <p:tgtEl>
+                                          <p:spTgt spid="4"/>
+                                        </p:tgtEl>
+                                      </p:cBhvr>
+                                    </p:animEffect>
+                                  </p:childTnLst>
+                                </p:cTn>
+                              </p:par>
+                            </p:childTnLst>
+                          </p:cTn>
+                        </p:par>
+                      </p:childTnLst>
+                    </p:cTn>
+                  </p:par>
+                </p:childTnLst>
+              </p:cTn>
+              <p:prevCondLst>
+                <p:cond evt="onPrev" delay="0">
+                  <p:tgtEl>
+                    <p:sldTgt/>
+                  </p:tgtEl>
+                </p:cond>
+              </p:prevCondLst>
+              <p:nextCondLst>
+                <p:cond evt="onNext" delay="0">
+                  <p:tgtEl>
+                    <p:sldTgt/>
+                  </p:tgtEl>
+                </p:cond>
+              </p:nextCondLst>
+            </p:seq>
+          </p:childTnLst>
+        </p:cTn>
+      </p:par>
+    </p:tnLst>
+    <p:bldLst>
+      <p:bldP spid="4" grpId="0" animBg="1"/>
+    </p:bldLst>
+  </p:timing>
+</p:sld>
+</file>
+
+<file path=ppt/slides/slide12.xml><?xml version="1.0" encoding="utf-8"?>
+<p:sld xmlns:a="http://schemas.openxmlformats.org/drawingml/2006/main" xmlns:r="http://schemas.openxmlformats.org/officeDocument/2006/relationships" xmlns:p="http://schemas.openxmlformats.org/presentationml/2006/main">
+  <p:cSld>
+    <p:spTree>
+      <p:nvGrpSpPr>
+        <p:cNvPr id="1" name=""/>
+        <p:cNvGrpSpPr/>
+        <p:nvPr/>
+      </p:nvGrpSpPr>
+      <p:grpSpPr>
+        <a:xfrm>
+          <a:off x="0" y="0"/>
+          <a:ext cx="0" cy="0"/>
+          <a:chOff x="0" y="0"/>
+          <a:chExt cx="0" cy="0"/>
+        </a:xfrm>
+      </p:grpSpPr>
+      <p:sp>
+        <p:nvSpPr>
+          <p:cNvPr id="2" name="Titel 1"/>
+          <p:cNvSpPr>
+            <a:spLocks noGrp="1"/>
+          </p:cNvSpPr>
+          <p:nvPr>
+            <p:ph type="title"/>
+          </p:nvPr>
+        </p:nvSpPr>
+        <p:spPr/>
+        <p:txBody>
+          <a:bodyPr/>
+          <a:lstStyle/>
+          <a:p>
+            <a:r>
+              <a:rPr lang="en-US" dirty="0" smtClean="0"/>
+              <a:t>Demo</a:t>
+            </a:r>
+            <a:endParaRPr lang="en-US" dirty="0"/>
+          </a:p>
+        </p:txBody>
+      </p:sp>
+      <p:sp>
+        <p:nvSpPr>
+          <p:cNvPr id="3" name="Inhaltsplatzhalter 2"/>
+          <p:cNvSpPr>
+            <a:spLocks noGrp="1"/>
+          </p:cNvSpPr>
+          <p:nvPr>
+            <p:ph idx="1"/>
+          </p:nvPr>
+        </p:nvSpPr>
+        <p:spPr/>
+        <p:txBody>
+          <a:bodyPr/>
+          <a:lstStyle/>
+          <a:p>
+            <a:r>
+              <a:rPr lang="en-US" dirty="0" smtClean="0"/>
+              <a:t>Calculator sample</a:t>
+            </a:r>
+          </a:p>
+          <a:p>
+            <a:r>
+              <a:rPr lang="en-US" dirty="0" smtClean="0">
+                <a:hlinkClick r:id="rId3"/>
+              </a:rPr>
+              <a:t>http://bitbucket.org/forki/fake/downloads/</a:t>
+            </a:r>
+            <a:endParaRPr lang="en-US" dirty="0" smtClean="0"/>
+          </a:p>
+          <a:p>
+            <a:pPr>
+              <a:buNone/>
+            </a:pPr>
+            <a:endParaRPr lang="en-US" dirty="0" smtClean="0"/>
+          </a:p>
+        </p:txBody>
+      </p:sp>
+    </p:spTree>
+  </p:cSld>
+  <p:clrMapOvr>
+    <a:masterClrMapping/>
+  </p:clrMapOvr>
+  <p:timing>
+    <p:tnLst>
+      <p:par>
+        <p:cTn id="1" dur="indefinite" restart="never" nodeType="tmRoot"/>
+      </p:par>
+    </p:tnLst>
+  </p:timing>
+</p:sld>
+</file>
+
+<file path=ppt/slides/slide13.xml><?xml version="1.0" encoding="utf-8"?>
+<p:sld xmlns:a="http://schemas.openxmlformats.org/drawingml/2006/main" xmlns:r="http://schemas.openxmlformats.org/officeDocument/2006/relationships" xmlns:p="http://schemas.openxmlformats.org/presentationml/2006/main">
+  <p:cSld>
+    <p:spTree>
+      <p:nvGrpSpPr>
+        <p:cNvPr id="1" name=""/>
+        <p:cNvGrpSpPr/>
+        <p:nvPr/>
+      </p:nvGrpSpPr>
+      <p:grpSpPr>
+        <a:xfrm>
+          <a:off x="0" y="0"/>
+          <a:ext cx="0" cy="0"/>
+          <a:chOff x="0" y="0"/>
+          <a:chExt cx="0" cy="0"/>
+        </a:xfrm>
+      </p:grpSpPr>
+      <p:sp>
+        <p:nvSpPr>
+          <p:cNvPr id="2" name="Titel 1"/>
+          <p:cNvSpPr>
+            <a:spLocks noGrp="1"/>
+          </p:cNvSpPr>
+          <p:nvPr>
+            <p:ph type="title"/>
+          </p:nvPr>
+        </p:nvSpPr>
+        <p:spPr/>
+        <p:txBody>
+          <a:bodyPr/>
+          <a:lstStyle/>
+          <a:p>
+            <a:r>
+              <a:rPr lang="de-DE" dirty="0" err="1" smtClean="0"/>
+              <a:t>NaturalSpec</a:t>
+            </a:r>
+            <a:endParaRPr lang="de-DE" dirty="0"/>
+          </a:p>
+        </p:txBody>
+      </p:sp>
+      <p:sp>
+        <p:nvSpPr>
+          <p:cNvPr id="3" name="Inhaltsplatzhalter 2"/>
+          <p:cNvSpPr>
+            <a:spLocks noGrp="1"/>
+          </p:cNvSpPr>
+          <p:nvPr>
+            <p:ph idx="1"/>
+          </p:nvPr>
+        </p:nvSpPr>
+        <p:spPr/>
+        <p:txBody>
+          <a:bodyPr/>
+          <a:lstStyle/>
+          <a:p>
+            <a:r>
+              <a:rPr lang="en-US" dirty="0" smtClean="0"/>
+              <a:t>Domain-specific language for testing</a:t>
+            </a:r>
+          </a:p>
+          <a:p>
+            <a:pPr lvl="1"/>
+            <a:r>
+              <a:rPr lang="en-US" dirty="0" smtClean="0"/>
+              <a:t>AAA - Arrange, Act, Assert</a:t>
+            </a:r>
+          </a:p>
+          <a:p>
+            <a:r>
+              <a:rPr lang="en-US" dirty="0" smtClean="0"/>
+              <a:t>Embedded in F#</a:t>
+            </a:r>
+          </a:p>
+          <a:p>
+            <a:r>
+              <a:rPr lang="en-US" dirty="0" smtClean="0"/>
+              <a:t>Works nicely with “FAKE – F# Make” ;-)</a:t>
+            </a:r>
+          </a:p>
+          <a:p>
+            <a:r>
+              <a:rPr lang="en-US" dirty="0" smtClean="0"/>
+              <a:t>Based on </a:t>
+            </a:r>
+            <a:r>
+              <a:rPr lang="en-US" dirty="0" err="1" smtClean="0"/>
+              <a:t>NUnit</a:t>
+            </a:r>
+            <a:endParaRPr lang="en-US" dirty="0" smtClean="0"/>
+          </a:p>
+          <a:p>
+            <a:r>
+              <a:rPr lang="en-US" dirty="0" smtClean="0"/>
+              <a:t>Works with all </a:t>
+            </a:r>
+            <a:r>
+              <a:rPr lang="en-US" dirty="0" err="1" smtClean="0"/>
+              <a:t>NUnit</a:t>
+            </a:r>
+            <a:r>
+              <a:rPr lang="en-US" dirty="0" smtClean="0"/>
+              <a:t> runners</a:t>
+            </a:r>
+          </a:p>
+          <a:p>
+            <a:pPr lvl="1"/>
+            <a:r>
+              <a:rPr lang="en-US" dirty="0" smtClean="0"/>
+              <a:t>Including </a:t>
+            </a:r>
+            <a:r>
+              <a:rPr lang="en-US" dirty="0" err="1" smtClean="0"/>
+              <a:t>Resharper</a:t>
+            </a:r>
+            <a:r>
+              <a:rPr lang="en-US" dirty="0" smtClean="0"/>
+              <a:t> </a:t>
+            </a:r>
+            <a:r>
+              <a:rPr lang="en-US" dirty="0" err="1" smtClean="0"/>
+              <a:t>UnitTest</a:t>
+            </a:r>
+            <a:r>
+              <a:rPr lang="en-US" dirty="0" smtClean="0"/>
+              <a:t> runner</a:t>
+            </a:r>
+          </a:p>
+          <a:p>
+            <a:pPr lvl="1"/>
+            <a:endParaRPr lang="en-US" dirty="0" smtClean="0"/>
+          </a:p>
+          <a:p>
+            <a:r>
+              <a:rPr lang="en-US" dirty="0" smtClean="0"/>
+              <a:t>http://bitbucket.org/forki/naturalspec</a:t>
+            </a:r>
+          </a:p>
+          <a:p>
+            <a:endParaRPr lang="de-DE" dirty="0" smtClean="0"/>
+          </a:p>
+        </p:txBody>
+      </p:sp>
+    </p:spTree>
+  </p:cSld>
+  <p:clrMapOvr>
+    <a:masterClrMapping/>
+  </p:clrMapOvr>
+  <p:timing>
+    <p:tnLst>
+      <p:par>
+        <p:cTn id="1" dur="indefinite" restart="never" nodeType="tmRoot">
+          <p:childTnLst>
+            <p:seq concurrent="1" nextAc="seek">
+              <p:cTn id="2" dur="indefinite" nodeType="mainSeq">
+                <p:childTnLst>
+                  <p:par>
+                    <p:cTn id="3" fill="hold">
+                      <p:stCondLst>
+                        <p:cond delay="indefinite"/>
+                      </p:stCondLst>
+                      <p:childTnLst>
+                        <p:par>
+                          <p:cTn id="4" fill="hold">
+                            <p:stCondLst>
+                              <p:cond delay="0"/>
+                            </p:stCondLst>
+                            <p:childTnLst>
+                              <p:par>
+                                <p:cTn id="5" presetID="1" presetClass="entr" presetSubtype="0" fill="hold" nodeType="clickEffect">
+                                  <p:stCondLst>
+                                    <p:cond delay="0"/>
+                                  </p:stCondLst>
+                                  <p:childTnLst>
+                                    <p:set>
+                                      <p:cBhvr>
+                                        <p:cTn id="6" dur="1" fill="hold">
+                                          <p:stCondLst>
+                                            <p:cond delay="0"/>
+                                          </p:stCondLst>
+                                        </p:cTn>
+                                        <p:tgtEl>
+                                          <p:spTgt spid="3">
+                                            <p:txEl>
+                                              <p:pRg st="0" end="0"/>
+                                            </p:txEl>
+                                          </p:spTgt>
+                                        </p:tgtEl>
+                                        <p:attrNameLst>
+                                          <p:attrName>style.visibility</p:attrName>
+                                        </p:attrNameLst>
+                                      </p:cBhvr>
+                                      <p:to>
+                                        <p:strVal val="visible"/>
+                                      </p:to>
+                                    </p:set>
+                                  </p:childTnLst>
+                                </p:cTn>
+                              </p:par>
+                              <p:par>
+                                <p:cTn id="7" presetID="1" presetClass="entr" presetSubtype="0" fill="hold" nodeType="withEffect">
+                                  <p:stCondLst>
+                                    <p:cond delay="0"/>
+                                  </p:stCondLst>
+                                  <p:childTnLst>
+                                    <p:set>
+                                      <p:cBhvr>
+                                        <p:cTn id="8" dur="1" fill="hold">
+                                          <p:stCondLst>
+                                            <p:cond delay="0"/>
+                                          </p:stCondLst>
+                                        </p:cTn>
+                                        <p:tgtEl>
+                                          <p:spTgt spid="3">
+                                            <p:txEl>
+                                              <p:pRg st="1" end="1"/>
+                                            </p:txEl>
+                                          </p:spTgt>
+                                        </p:tgtEl>
+                                        <p:attrNameLst>
+                                          <p:attrName>style.visibility</p:attrName>
+                                        </p:attrNameLst>
+                                      </p:cBhvr>
+                                      <p:to>
+                                        <p:strVal val="visible"/>
+                                      </p:to>
+                                    </p:set>
+                                  </p:childTnLst>
+                                </p:cTn>
+                              </p:par>
+                            </p:childTnLst>
+                          </p:cTn>
+                        </p:par>
+                      </p:childTnLst>
+                    </p:cTn>
+                  </p:par>
+                  <p:par>
+                    <p:cTn id="9" fill="hold">
+                      <p:stCondLst>
+                        <p:cond delay="indefinite"/>
+                      </p:stCondLst>
+                      <p:childTnLst>
+                        <p:par>
+                          <p:cTn id="10" fill="hold">
+                            <p:stCondLst>
+                              <p:cond delay="0"/>
+                            </p:stCondLst>
+                            <p:childTnLst>
+                              <p:par>
+                                <p:cTn id="11" presetID="1" presetClass="entr" presetSubtype="0" fill="hold" nodeType="clickEffect">
+                                  <p:stCondLst>
+                                    <p:cond delay="0"/>
+                                  </p:stCondLst>
+                                  <p:childTnLst>
+                                    <p:set>
+                                      <p:cBhvr>
+                                        <p:cTn id="12" dur="1" fill="hold">
+                                          <p:stCondLst>
+                                            <p:cond delay="0"/>
+                                          </p:stCondLst>
+                                        </p:cTn>
+                                        <p:tgtEl>
+                                          <p:spTgt spid="3">
+                                            <p:txEl>
+                                              <p:pRg st="2" end="2"/>
+                                            </p:txEl>
+                                          </p:spTgt>
+                                        </p:tgtEl>
+                                        <p:attrNameLst>
+                                          <p:attrName>style.visibility</p:attrName>
+                                        </p:attrNameLst>
+                                      </p:cBhvr>
+                                      <p:to>
+                                        <p:strVal val="visible"/>
+                                      </p:to>
+                                    </p:set>
+                                  </p:childTnLst>
+                                </p:cTn>
+                              </p:par>
+                            </p:childTnLst>
+                          </p:cTn>
+                        </p:par>
+                      </p:childTnLst>
+                    </p:cTn>
+                  </p:par>
+                  <p:par>
+                    <p:cTn id="13" fill="hold">
+                      <p:stCondLst>
+                        <p:cond delay="indefinite"/>
+                      </p:stCondLst>
+                      <p:childTnLst>
+                        <p:par>
+                          <p:cTn id="14" fill="hold">
+                            <p:stCondLst>
+                              <p:cond delay="0"/>
+                            </p:stCondLst>
+                            <p:childTnLst>
+                              <p:par>
+                                <p:cTn id="15" presetID="1" presetClass="entr" presetSubtype="0" fill="hold" nodeType="clickEffect">
+                                  <p:stCondLst>
+                                    <p:cond delay="0"/>
+                                  </p:stCondLst>
+                                  <p:childTnLst>
+                                    <p:set>
+                                      <p:cBhvr>
+                                        <p:cTn id="16" dur="1" fill="hold">
+                                          <p:stCondLst>
+                                            <p:cond delay="0"/>
+                                          </p:stCondLst>
+                                        </p:cTn>
+                                        <p:tgtEl>
+                                          <p:spTgt spid="3">
+                                            <p:txEl>
+                                              <p:pRg st="3" end="3"/>
+                                            </p:txEl>
+                                          </p:spTgt>
+                                        </p:tgtEl>
+                                        <p:attrNameLst>
+                                          <p:attrName>style.visibility</p:attrName>
+                                        </p:attrNameLst>
+                                      </p:cBhvr>
+                                      <p:to>
+                                        <p:strVal val="visible"/>
+                                      </p:to>
+                                    </p:set>
+                                  </p:childTnLst>
+                                </p:cTn>
+                              </p:par>
+                            </p:childTnLst>
+                          </p:cTn>
+                        </p:par>
+                      </p:childTnLst>
+                    </p:cTn>
+                  </p:par>
+                  <p:par>
+                    <p:cTn id="17" fill="hold">
+                      <p:stCondLst>
+                        <p:cond delay="indefinite"/>
+                      </p:stCondLst>
+                      <p:childTnLst>
+                        <p:par>
+                          <p:cTn id="18" fill="hold">
+                            <p:stCondLst>
+                              <p:cond delay="0"/>
+                            </p:stCondLst>
+                            <p:childTnLst>
+                              <p:par>
+                                <p:cTn id="19" presetID="1" presetClass="entr" presetSubtype="0" fill="hold" nodeType="clickEffect">
+                                  <p:stCondLst>
+                                    <p:cond delay="0"/>
+                                  </p:stCondLst>
+                                  <p:childTnLst>
+                                    <p:set>
+                                      <p:cBhvr>
+                                        <p:cTn id="20" dur="1" fill="hold">
+                                          <p:stCondLst>
+                                            <p:cond delay="0"/>
+                                          </p:stCondLst>
+                                        </p:cTn>
+                                        <p:tgtEl>
+                                          <p:spTgt spid="3">
+                                            <p:txEl>
+                                              <p:pRg st="4" end="4"/>
+                                            </p:txEl>
+                                          </p:spTgt>
+                                        </p:tgtEl>
+                                        <p:attrNameLst>
+                                          <p:attrName>style.visibility</p:attrName>
+                                        </p:attrNameLst>
+                                      </p:cBhvr>
+                                      <p:to>
+                                        <p:strVal val="visible"/>
+                                      </p:to>
+                                    </p:set>
+                                  </p:childTnLst>
+                                </p:cTn>
+                              </p:par>
+                              <p:par>
+                                <p:cTn id="21" presetID="1" presetClass="entr" presetSubtype="0" fill="hold" nodeType="withEffect">
+                                  <p:stCondLst>
+                                    <p:cond delay="0"/>
+                                  </p:stCondLst>
+                                  <p:childTnLst>
+                                    <p:set>
+                                      <p:cBhvr>
+                                        <p:cTn id="22" dur="1" fill="hold">
+                                          <p:stCondLst>
+                                            <p:cond delay="0"/>
+                                          </p:stCondLst>
+                                        </p:cTn>
+                                        <p:tgtEl>
+                                          <p:spTgt spid="3">
+                                            <p:txEl>
+                                              <p:pRg st="5" end="5"/>
+                                            </p:txEl>
+                                          </p:spTgt>
+                                        </p:tgtEl>
+                                        <p:attrNameLst>
+                                          <p:attrName>style.visibility</p:attrName>
+                                        </p:attrNameLst>
+                                      </p:cBhvr>
+                                      <p:to>
+                                        <p:strVal val="visible"/>
+                                      </p:to>
+                                    </p:set>
+                                  </p:childTnLst>
+                                </p:cTn>
+                              </p:par>
+                              <p:par>
+                                <p:cTn id="23" presetID="1" presetClass="entr" presetSubtype="0" fill="hold" nodeType="withEffect">
+                                  <p:stCondLst>
+                                    <p:cond delay="0"/>
+                                  </p:stCondLst>
+                                  <p:childTnLst>
+                                    <p:set>
+                                      <p:cBhvr>
+                                        <p:cTn id="24" dur="1" fill="hold">
+                                          <p:stCondLst>
+                                            <p:cond delay="0"/>
+                                          </p:stCondLst>
+                                        </p:cTn>
+                                        <p:tgtEl>
+                                          <p:spTgt spid="3">
+                                            <p:txEl>
+                                              <p:pRg st="6" end="6"/>
+                                            </p:txEl>
+                                          </p:spTgt>
+                                        </p:tgtEl>
+                                        <p:attrNameLst>
+                                          <p:attrName>style.visibility</p:attrName>
+                                        </p:attrNameLst>
+                                      </p:cBhvr>
+                                      <p:to>
+                                        <p:strVal val="visible"/>
+                                      </p:to>
+                                    </p:set>
+                                  </p:childTnLst>
+                                </p:cTn>
+                              </p:par>
+                            </p:childTnLst>
+                          </p:cTn>
+                        </p:par>
+                      </p:childTnLst>
+                    </p:cTn>
+                  </p:par>
+                </p:childTnLst>
+              </p:cTn>
+              <p:prevCondLst>
+                <p:cond evt="onPrev" delay="0">
+                  <p:tgtEl>
+                    <p:sldTgt/>
+                  </p:tgtEl>
+                </p:cond>
+              </p:prevCondLst>
+              <p:nextCondLst>
+                <p:cond evt="onNext" delay="0">
+                  <p:tgtEl>
+                    <p:sldTgt/>
+                  </p:tgtEl>
+                </p:cond>
+              </p:nextCondLst>
+            </p:seq>
+          </p:childTnLst>
+        </p:cTn>
+      </p:par>
+    </p:tnLst>
+  </p:timing>
+</p:sld>
+</file>
+
+<file path=ppt/slides/slide14.xml><?xml version="1.0" encoding="utf-8"?>
+<p:sld xmlns:a="http://schemas.openxmlformats.org/drawingml/2006/main" xmlns:r="http://schemas.openxmlformats.org/officeDocument/2006/relationships" xmlns:p="http://schemas.openxmlformats.org/presentationml/2006/main">
+  <p:cSld>
+    <p:spTree>
+      <p:nvGrpSpPr>
+        <p:cNvPr id="1" name=""/>
+        <p:cNvGrpSpPr/>
+        <p:nvPr/>
+      </p:nvGrpSpPr>
+      <p:grpSpPr>
+        <a:xfrm>
+          <a:off x="0" y="0"/>
+          <a:ext cx="0" cy="0"/>
+          <a:chOff x="0" y="0"/>
+          <a:chExt cx="0" cy="0"/>
+        </a:xfrm>
+      </p:grpSpPr>
+      <p:sp>
+        <p:nvSpPr>
+          <p:cNvPr id="2" name="Titel 1"/>
+          <p:cNvSpPr>
+            <a:spLocks noGrp="1"/>
+          </p:cNvSpPr>
+          <p:nvPr>
+            <p:ph type="title"/>
+          </p:nvPr>
+        </p:nvSpPr>
+        <p:spPr/>
+        <p:txBody>
+          <a:bodyPr/>
+          <a:lstStyle/>
+          <a:p>
+            <a:r>
               <a:rPr lang="de-DE" dirty="0" smtClean="0"/>
               <a:t>Scenario</a:t>
             </a:r>
@@ -5446,7 +6910,7 @@
             </a:pPr>
             <a:r>
               <a:rPr lang="en-US" sz="1800" dirty="0" smtClean="0"/>
-              <a:t>[Scenario]</a:t>
+              <a:t>[&lt;Scenario&gt;]</a:t>
             </a:r>
           </a:p>
           <a:p>
@@ -5455,7 +6919,15 @@
             </a:pPr>
             <a:r>
               <a:rPr lang="en-US" sz="1800" dirty="0" smtClean="0"/>
-              <a:t>let When_removing_an_element_from_a_list_it_should_not_contain_the_element() =</a:t>
+              <a:t>let </a:t>
+            </a:r>
+            <a:r>
+              <a:rPr lang="en-US" sz="1800" dirty="0" smtClean="0"/>
+              <a:t>``When removing an element from a list it should not contain the element``() </a:t>
+            </a:r>
+            <a:r>
+              <a:rPr lang="en-US" sz="1800" dirty="0" smtClean="0"/>
+              <a:t>=</a:t>
             </a:r>
           </a:p>
           <a:p>
@@ -5464,11 +6936,7 @@
             </a:pPr>
             <a:r>
               <a:rPr lang="en-US" sz="1800" dirty="0" smtClean="0"/>
-              <a:t>  Given [1;2;3;4;5]                 </a:t>
-            </a:r>
-            <a:r>
-              <a:rPr lang="en-US" sz="1800" dirty="0" smtClean="0"/>
-              <a:t>                </a:t>
+              <a:t>  Given [1;2;3;4;5]                                 </a:t>
             </a:r>
             <a:r>
               <a:rPr lang="en-US" sz="1800" dirty="0" smtClean="0">
@@ -5476,7 +6944,20 @@
                   <a:schemeClr val="accent4"/>
                 </a:solidFill>
               </a:rPr>
-              <a:t>// </a:t>
+              <a:t>// "Arrange" test context</a:t>
+            </a:r>
+          </a:p>
+          <a:p>
+            <a:pPr>
+              <a:buNone/>
+            </a:pPr>
+            <a:r>
+              <a:rPr lang="en-US" sz="1800" dirty="0" smtClean="0"/>
+              <a:t>    |&gt; When removing </a:t>
+            </a:r>
+            <a:r>
+              <a:rPr lang="en-US" sz="1800" dirty="0" smtClean="0"/>
+              <a:t>4                       </a:t>
             </a:r>
             <a:r>
               <a:rPr lang="en-US" sz="1800" dirty="0" smtClean="0">
@@ -5484,7 +6965,7 @@
                   <a:schemeClr val="accent4"/>
                 </a:solidFill>
               </a:rPr>
-              <a:t>"Arrange" test context</a:t>
+              <a:t>// "Act"</a:t>
             </a:r>
           </a:p>
           <a:p>
@@ -5493,11 +6974,11 @@
             </a:pPr>
             <a:r>
               <a:rPr lang="en-US" sz="1800" dirty="0" smtClean="0"/>
-              <a:t>    |&gt; When removing 3              </a:t>
+              <a:t>    |&gt; It shouldn't contain </a:t>
             </a:r>
             <a:r>
               <a:rPr lang="en-US" sz="1800" dirty="0" smtClean="0"/>
-              <a:t>         </a:t>
+              <a:t>4                </a:t>
             </a:r>
             <a:r>
               <a:rPr lang="en-US" sz="1800" dirty="0" smtClean="0">
@@ -5505,7 +6986,20 @@
                   <a:schemeClr val="accent4"/>
                 </a:solidFill>
               </a:rPr>
-              <a:t>// </a:t>
+              <a:t>// "Assert"</a:t>
+            </a:r>
+          </a:p>
+          <a:p>
+            <a:pPr>
+              <a:buNone/>
+            </a:pPr>
+            <a:r>
+              <a:rPr lang="en-US" sz="1800" dirty="0" smtClean="0"/>
+              <a:t>    |&gt; It should contain </a:t>
+            </a:r>
+            <a:r>
+              <a:rPr lang="en-US" sz="1800" dirty="0" smtClean="0"/>
+              <a:t>5                     </a:t>
             </a:r>
             <a:r>
               <a:rPr lang="en-US" sz="1800" dirty="0" smtClean="0">
@@ -5513,7 +7007,7 @@
                   <a:schemeClr val="accent4"/>
                 </a:solidFill>
               </a:rPr>
-              <a:t>"Act"</a:t>
+              <a:t>// another assertion</a:t>
             </a:r>
           </a:p>
           <a:p>
@@ -5522,11 +7016,7 @@
             </a:pPr>
             <a:r>
               <a:rPr lang="en-US" sz="1800" dirty="0" smtClean="0"/>
-              <a:t>    |&gt; It shouldn't contain 3       </a:t>
-            </a:r>
-            <a:r>
-              <a:rPr lang="en-US" sz="1800" dirty="0" smtClean="0"/>
-              <a:t>         </a:t>
+              <a:t>    |&gt; It should have (Length 4)        </a:t>
             </a:r>
             <a:r>
               <a:rPr lang="en-US" sz="1800" dirty="0" smtClean="0">
@@ -5534,7 +7024,16 @@
                   <a:schemeClr val="accent4"/>
                 </a:solidFill>
               </a:rPr>
-              <a:t>// </a:t>
+              <a:t>// Assertion for length</a:t>
+            </a:r>
+          </a:p>
+          <a:p>
+            <a:pPr>
+              <a:buNone/>
+            </a:pPr>
+            <a:r>
+              <a:rPr lang="en-US" sz="1800" dirty="0" smtClean="0"/>
+              <a:t>    |&gt; It shouldn't have Duplicates  </a:t>
             </a:r>
             <a:r>
               <a:rPr lang="en-US" sz="1800" dirty="0" smtClean="0">
@@ -5542,7 +7041,7 @@
                   <a:schemeClr val="accent4"/>
                 </a:solidFill>
               </a:rPr>
-              <a:t>"Assert"</a:t>
+              <a:t>// Tests if the context contains duplicates</a:t>
             </a:r>
           </a:p>
           <a:p>
@@ -5551,11 +7050,7 @@
             </a:pPr>
             <a:r>
               <a:rPr lang="en-US" sz="1800" dirty="0" smtClean="0"/>
-              <a:t>    |&gt; It should contain 4          </a:t>
-            </a:r>
-            <a:r>
-              <a:rPr lang="en-US" sz="1800" dirty="0" smtClean="0"/>
-              <a:t>           </a:t>
+              <a:t>    |&gt; Verify                                               </a:t>
             </a:r>
             <a:r>
               <a:rPr lang="en-US" sz="1800" dirty="0" smtClean="0">
@@ -5563,110 +7058,7 @@
                   <a:schemeClr val="accent4"/>
                 </a:solidFill>
               </a:rPr>
-              <a:t>// </a:t>
-            </a:r>
-            <a:r>
-              <a:rPr lang="en-US" sz="1800" dirty="0" smtClean="0">
-                <a:solidFill>
-                  <a:schemeClr val="accent4"/>
-                </a:solidFill>
-              </a:rPr>
-              <a:t>another assertion</a:t>
-            </a:r>
-          </a:p>
-          <a:p>
-            <a:pPr>
-              <a:buNone/>
-            </a:pPr>
-            <a:r>
-              <a:rPr lang="en-US" sz="1800" dirty="0" smtClean="0"/>
-              <a:t>    |&gt; It should have (Length 4)    </a:t>
-            </a:r>
-            <a:r>
-              <a:rPr lang="en-US" sz="1800" dirty="0" smtClean="0"/>
-              <a:t>    </a:t>
-            </a:r>
-            <a:r>
-              <a:rPr lang="en-US" sz="1800" dirty="0" smtClean="0">
-                <a:solidFill>
-                  <a:schemeClr val="accent4"/>
-                </a:solidFill>
-              </a:rPr>
-              <a:t>// </a:t>
-            </a:r>
-            <a:r>
-              <a:rPr lang="en-US" sz="1800" dirty="0" smtClean="0">
-                <a:solidFill>
-                  <a:schemeClr val="accent4"/>
-                </a:solidFill>
-              </a:rPr>
-              <a:t>Assertion for length</a:t>
-            </a:r>
-          </a:p>
-          <a:p>
-            <a:pPr>
-              <a:buNone/>
-            </a:pPr>
-            <a:r>
-              <a:rPr lang="en-US" sz="1800" dirty="0" smtClean="0"/>
-              <a:t>    |&gt; It shouldn't have Duplicates </a:t>
-            </a:r>
-            <a:r>
-              <a:rPr lang="en-US" sz="1800" dirty="0" smtClean="0"/>
-              <a:t> </a:t>
-            </a:r>
-            <a:r>
-              <a:rPr lang="en-US" sz="1800" dirty="0" smtClean="0">
-                <a:solidFill>
-                  <a:schemeClr val="accent4"/>
-                </a:solidFill>
-              </a:rPr>
-              <a:t>// </a:t>
-            </a:r>
-            <a:r>
-              <a:rPr lang="en-US" sz="1800" dirty="0" smtClean="0">
-                <a:solidFill>
-                  <a:schemeClr val="accent4"/>
-                </a:solidFill>
-              </a:rPr>
-              <a:t>Tests if the context contains duplicates</a:t>
-            </a:r>
-          </a:p>
-          <a:p>
-            <a:pPr>
-              <a:buNone/>
-            </a:pPr>
-            <a:r>
-              <a:rPr lang="en-US" sz="1800" dirty="0" smtClean="0"/>
-              <a:t>    |&gt; Verify      </a:t>
-            </a:r>
-            <a:r>
-              <a:rPr lang="en-US" sz="1800" dirty="0" smtClean="0"/>
-              <a:t>                                         </a:t>
-            </a:r>
-            <a:r>
-              <a:rPr lang="en-US" sz="1800" dirty="0" smtClean="0">
-                <a:solidFill>
-                  <a:schemeClr val="accent4"/>
-                </a:solidFill>
-              </a:rPr>
-              <a:t>// </a:t>
-            </a:r>
-            <a:r>
-              <a:rPr lang="en-US" sz="1800" dirty="0" smtClean="0">
-                <a:solidFill>
-                  <a:schemeClr val="accent4"/>
-                </a:solidFill>
-              </a:rPr>
-              <a:t>Verify </a:t>
-            </a:r>
-            <a:r>
-              <a:rPr lang="en-US" sz="1800" dirty="0" smtClean="0">
-                <a:solidFill>
-                  <a:schemeClr val="accent4"/>
-                </a:solidFill>
-              </a:rPr>
-              <a:t>scenario</a:t>
+              <a:t>// Verify scenario</a:t>
             </a:r>
           </a:p>
           <a:p>
@@ -5717,8 +7109,13 @@
                   </a:schemeClr>
                 </a:solidFill>
               </a:rPr>
-              <a:t>Scenario</a:t>
-            </a:r>
+              <a:t>Scenario: When removing an element from a list it should not contain the element</a:t>
+            </a:r>
+          </a:p>
+          <a:p>
+            <a:pPr>
+              <a:buNone/>
+            </a:pPr>
             <a:r>
               <a:rPr lang="en-US" sz="1800" dirty="0" smtClean="0">
                 <a:solidFill>
@@ -5727,7 +7124,7 @@
                   </a:schemeClr>
                 </a:solidFill>
               </a:rPr>
-              <a:t>: When removing an element from a list it should not contain the element</a:t>
+              <a:t>  - Given [1; 2; 3; 4; 5]</a:t>
             </a:r>
           </a:p>
           <a:p>
@@ -5742,7 +7139,7 @@
                   </a:schemeClr>
                 </a:solidFill>
               </a:rPr>
-              <a:t>  - Given [1; 2; 3; 4; 5</a:t>
+              <a:t>    - When removing </a:t>
             </a:r>
             <a:r>
               <a:rPr lang="en-US" sz="1800" dirty="0" smtClean="0">
@@ -5752,7 +7149,7 @@
                   </a:schemeClr>
                 </a:solidFill>
               </a:rPr>
-              <a:t>]</a:t>
+              <a:t>4</a:t>
             </a:r>
             <a:endParaRPr lang="en-US" sz="1800" dirty="0" smtClean="0">
               <a:solidFill>
@@ -5774,13 +7171,8 @@
                   </a:schemeClr>
                 </a:solidFill>
               </a:rPr>
-              <a:t>    - When removing 3</a:t>
-            </a:r>
-          </a:p>
-          <a:p>
-            <a:pPr>
-              <a:buNone/>
-            </a:pPr>
+              <a:t>      =&gt; It should not contain </a:t>
+            </a:r>
             <a:r>
               <a:rPr lang="en-US" sz="1800" dirty="0" smtClean="0">
                 <a:solidFill>
@@ -5789,8 +7181,15 @@
                   </a:schemeClr>
                 </a:solidFill>
               </a:rPr>
-              <a:t>      =&gt; It should not contain 3</a:t>
-            </a:r>
+              <a:t>4</a:t>
+            </a:r>
+            <a:endParaRPr lang="en-US" sz="1800" dirty="0" smtClean="0">
+              <a:solidFill>
+                <a:schemeClr val="tx1">
+                  <a:lumMod val="65000"/>
+                </a:schemeClr>
+              </a:solidFill>
+            </a:endParaRPr>
           </a:p>
           <a:p>
             <a:pPr>
@@ -5804,8 +7203,25 @@
                   </a:schemeClr>
                 </a:solidFill>
               </a:rPr>
-              <a:t>      =&gt; It should contain 4</a:t>
-            </a:r>
+              <a:t>      =&gt; It should contain </a:t>
+            </a:r>
+            <a:r>
+              <a:rPr lang="en-US" sz="1800" dirty="0" smtClean="0">
+                <a:solidFill>
+                  <a:schemeClr val="tx1">
+                    <a:lumMod val="65000"/>
+                  </a:schemeClr>
+                </a:solidFill>
+              </a:rPr>
+              <a:t>5</a:t>
+            </a:r>
+            <a:endParaRPr lang="en-US" sz="1800" dirty="0" smtClean="0">
+              <a:solidFill>
+                <a:schemeClr val="tx1">
+                  <a:lumMod val="65000"/>
+                </a:schemeClr>
+              </a:solidFill>
+            </a:endParaRPr>
           </a:p>
           <a:p>
             <a:pPr>
@@ -5834,27 +7250,7 @@
                   </a:schemeClr>
                 </a:solidFill>
               </a:rPr>
-              <a:t>      =&gt; It should </a:t>
-            </a:r>
-            <a:r>
-              <a:rPr lang="en-US" sz="1800" dirty="0" smtClean="0">
-                <a:solidFill>
-                  <a:schemeClr val="tx1">
-                    <a:lumMod val="65000"/>
-                  </a:schemeClr>
-                </a:solidFill>
-              </a:rPr>
-              <a:t>not </a:t>
-            </a:r>
-            <a:r>
-              <a:rPr lang="en-US" sz="1800" dirty="0" smtClean="0">
-                <a:solidFill>
-                  <a:schemeClr val="tx1">
-                    <a:lumMod val="65000"/>
-                  </a:schemeClr>
-                </a:solidFill>
-              </a:rPr>
-              <a:t>have Duplicates</a:t>
+              <a:t>      =&gt; It should not have Duplicates</a:t>
             </a:r>
           </a:p>
           <a:p>
@@ -6342,7 +7738,7 @@
 </p:sld>
 </file>
 
-<file path=ppt/slides/slide11.xml><?xml version="1.0" encoding="utf-8"?>
+<file path=ppt/slides/slide15.xml><?xml version="1.0" encoding="utf-8"?>
 <p:sld xmlns:a="http://schemas.openxmlformats.org/drawingml/2006/main" xmlns:r="http://schemas.openxmlformats.org/officeDocument/2006/relationships" xmlns:p="http://schemas.openxmlformats.org/presentationml/2006/main">
   <p:cSld>
     <p:spTree>
@@ -6375,10 +7771,10 @@
           <a:lstStyle/>
           <a:p>
             <a:r>
-              <a:rPr lang="de-DE" dirty="0" err="1" smtClean="0"/>
-              <a:t>FunctionalNHibernate</a:t>
-            </a:r>
-            <a:endParaRPr lang="de-DE" dirty="0"/>
+              <a:rPr lang="en-US" dirty="0" smtClean="0"/>
+              <a:t>Demo</a:t>
+            </a:r>
+            <a:endParaRPr lang="en-US" dirty="0"/>
           </a:p>
         </p:txBody>
       </p:sp>
@@ -6398,48 +7794,26 @@
           <a:lstStyle/>
           <a:p>
             <a:r>
+              <a:rPr lang="en-US" dirty="0" err="1" smtClean="0"/>
+              <a:t>NaturalSpec</a:t>
+            </a:r>
+            <a:endParaRPr lang="en-US" dirty="0" smtClean="0"/>
+          </a:p>
+          <a:p>
+            <a:pPr lvl="1"/>
+            <a:r>
+              <a:rPr lang="en-US" dirty="0" err="1" smtClean="0"/>
+              <a:t>NUnit</a:t>
+            </a:r>
+            <a:r>
               <a:rPr lang="en-US" dirty="0" smtClean="0"/>
-              <a:t>Idea: A </a:t>
+              <a:t> test </a:t>
             </a:r>
             <a:r>
               <a:rPr lang="en-US" dirty="0" smtClean="0"/>
-              <a:t>layer on top of </a:t>
-            </a:r>
-            <a:r>
-              <a:rPr lang="en-US" dirty="0" err="1" smtClean="0"/>
-              <a:t>NHibernate</a:t>
-            </a:r>
-            <a:r>
-              <a:rPr lang="en-US" dirty="0" smtClean="0"/>
-              <a:t> </a:t>
-            </a:r>
-            <a:r>
-              <a:rPr lang="en-US" dirty="0" smtClean="0"/>
-              <a:t>for working with F#'s immutable record </a:t>
-            </a:r>
-            <a:r>
-              <a:rPr lang="en-US" dirty="0" smtClean="0"/>
-              <a:t>types.</a:t>
-            </a:r>
-          </a:p>
-          <a:p>
-            <a:r>
-              <a:rPr lang="en-US" dirty="0" smtClean="0"/>
-              <a:t>Created by Robert Pickering</a:t>
-            </a:r>
-          </a:p>
-          <a:p>
+              <a:t>runner</a:t>
+            </a:r>
             <a:endParaRPr lang="en-US" dirty="0" smtClean="0"/>
-          </a:p>
-          <a:p>
-            <a:endParaRPr lang="en-US" dirty="0" smtClean="0"/>
-          </a:p>
-          <a:p>
-            <a:r>
-              <a:rPr lang="de-DE" sz="2800" dirty="0" smtClean="0"/>
-              <a:t>http://bitbucket.org/robertpi/functionalnhibernate/</a:t>
-            </a:r>
-            <a:endParaRPr lang="de-DE" sz="2800" dirty="0"/>
           </a:p>
         </p:txBody>
       </p:sp>
@@ -6458,7 +7832,111 @@
 </p:sld>
 </file>
 
-<file path=ppt/slides/slide12.xml><?xml version="1.0" encoding="utf-8"?>
+<file path=ppt/slides/slide16.xml><?xml version="1.0" encoding="utf-8"?>
+<p:sld xmlns:a="http://schemas.openxmlformats.org/drawingml/2006/main" xmlns:r="http://schemas.openxmlformats.org/officeDocument/2006/relationships" xmlns:p="http://schemas.openxmlformats.org/presentationml/2006/main">
+  <p:cSld>
+    <p:spTree>
+      <p:nvGrpSpPr>
+        <p:cNvPr id="1" name=""/>
+        <p:cNvGrpSpPr/>
+        <p:nvPr/>
+      </p:nvGrpSpPr>
+      <p:grpSpPr>
+        <a:xfrm>
+          <a:off x="0" y="0"/>
+          <a:ext cx="0" cy="0"/>
+          <a:chOff x="0" y="0"/>
+          <a:chExt cx="0" cy="0"/>
+        </a:xfrm>
+      </p:grpSpPr>
+      <p:sp>
+        <p:nvSpPr>
+          <p:cNvPr id="2" name="Titel 1"/>
+          <p:cNvSpPr>
+            <a:spLocks noGrp="1"/>
+          </p:cNvSpPr>
+          <p:nvPr>
+            <p:ph type="title"/>
+          </p:nvPr>
+        </p:nvSpPr>
+        <p:spPr/>
+        <p:txBody>
+          <a:bodyPr/>
+          <a:lstStyle/>
+          <a:p>
+            <a:r>
+              <a:rPr lang="de-DE" dirty="0" err="1" smtClean="0"/>
+              <a:t>FunctionalNHibernate</a:t>
+            </a:r>
+            <a:endParaRPr lang="de-DE" dirty="0"/>
+          </a:p>
+        </p:txBody>
+      </p:sp>
+      <p:sp>
+        <p:nvSpPr>
+          <p:cNvPr id="3" name="Inhaltsplatzhalter 2"/>
+          <p:cNvSpPr>
+            <a:spLocks noGrp="1"/>
+          </p:cNvSpPr>
+          <p:nvPr>
+            <p:ph idx="1"/>
+          </p:nvPr>
+        </p:nvSpPr>
+        <p:spPr/>
+        <p:txBody>
+          <a:bodyPr/>
+          <a:lstStyle/>
+          <a:p>
+            <a:r>
+              <a:rPr lang="en-US" dirty="0" smtClean="0"/>
+              <a:t>Idea: A layer on top of </a:t>
+            </a:r>
+            <a:r>
+              <a:rPr lang="en-US" dirty="0" err="1" smtClean="0"/>
+              <a:t>NHibernate</a:t>
+            </a:r>
+            <a:r>
+              <a:rPr lang="en-US" dirty="0" smtClean="0"/>
+              <a:t> for working with F#'s immutable record types.</a:t>
+            </a:r>
+          </a:p>
+          <a:p>
+            <a:r>
+              <a:rPr lang="en-US" dirty="0" smtClean="0"/>
+              <a:t>Created by Robert Pickering</a:t>
+            </a:r>
+          </a:p>
+          <a:p>
+            <a:endParaRPr lang="en-US" dirty="0" smtClean="0"/>
+          </a:p>
+          <a:p>
+            <a:endParaRPr lang="en-US" dirty="0" smtClean="0"/>
+          </a:p>
+          <a:p>
+            <a:r>
+              <a:rPr lang="en-US" sz="2800" dirty="0" smtClean="0"/>
+              <a:t>http://bitbucket.org/robertpi/functionalnhibernate/</a:t>
+            </a:r>
+            <a:endParaRPr lang="en-US" sz="2800" dirty="0"/>
+          </a:p>
+        </p:txBody>
+      </p:sp>
+    </p:spTree>
+  </p:cSld>
+  <p:clrMapOvr>
+    <a:masterClrMapping/>
+  </p:clrMapOvr>
+  <p:timing>
+    <p:tnLst>
+      <p:par>
+        <p:cTn id="1" dur="indefinite" restart="never" nodeType="tmRoot"/>
+      </p:par>
+    </p:tnLst>
+  </p:timing>
+</p:sld>
+</file>
+
+<file path=ppt/slides/slide17.xml><?xml version="1.0" encoding="utf-8"?>
 <p:sld xmlns:a="http://schemas.openxmlformats.org/drawingml/2006/main" xmlns:r="http://schemas.openxmlformats.org/officeDocument/2006/relationships" xmlns:p="http://schemas.openxmlformats.org/presentationml/2006/main">
   <p:cSld>
     <p:spTree>
@@ -8905,7 +10383,7 @@
 </p:sld>
 </file>
 
-<file path=ppt/slides/slide13.xml><?xml version="1.0" encoding="utf-8"?>
+<file path=ppt/slides/slide18.xml><?xml version="1.0" encoding="utf-8"?>
 <p:sld xmlns:a="http://schemas.openxmlformats.org/drawingml/2006/main" xmlns:r="http://schemas.openxmlformats.org/officeDocument/2006/relationships" xmlns:p="http://schemas.openxmlformats.org/presentationml/2006/main">
   <p:cSld>
     <p:spTree>
@@ -8977,165 +10455,23 @@
           <a:lstStyle/>
           <a:p>
             <a:r>
-              <a:rPr lang="de-DE" dirty="0" smtClean="0"/>
-              <a:t>All </a:t>
-            </a:r>
-            <a:r>
-              <a:rPr lang="de-DE" dirty="0" err="1" smtClean="0"/>
-              <a:t>fields</a:t>
-            </a:r>
-            <a:r>
-              <a:rPr lang="de-DE" dirty="0" smtClean="0"/>
-              <a:t> </a:t>
-            </a:r>
-            <a:r>
-              <a:rPr lang="de-DE" dirty="0" err="1" smtClean="0"/>
-              <a:t>and</a:t>
-            </a:r>
-            <a:r>
-              <a:rPr lang="de-DE" dirty="0" smtClean="0"/>
-              <a:t> </a:t>
-            </a:r>
-            <a:r>
-              <a:rPr lang="de-DE" dirty="0" err="1" smtClean="0"/>
-              <a:t>tables</a:t>
-            </a:r>
-            <a:r>
-              <a:rPr lang="de-DE" dirty="0" smtClean="0"/>
-              <a:t> </a:t>
-            </a:r>
-            <a:r>
-              <a:rPr lang="de-DE" dirty="0" err="1" smtClean="0"/>
-              <a:t>are</a:t>
-            </a:r>
-            <a:r>
-              <a:rPr lang="de-DE" dirty="0" smtClean="0"/>
-              <a:t> </a:t>
-            </a:r>
-            <a:r>
-              <a:rPr lang="de-DE" dirty="0" err="1" smtClean="0"/>
-              <a:t>named</a:t>
-            </a:r>
-            <a:r>
-              <a:rPr lang="de-DE" dirty="0" smtClean="0"/>
-              <a:t> </a:t>
-            </a:r>
-            <a:r>
-              <a:rPr lang="de-DE" dirty="0" err="1" smtClean="0"/>
-              <a:t>like</a:t>
-            </a:r>
-            <a:r>
-              <a:rPr lang="de-DE" dirty="0" smtClean="0"/>
-              <a:t> </a:t>
-            </a:r>
-            <a:r>
-              <a:rPr lang="de-DE" dirty="0" err="1" smtClean="0"/>
-              <a:t>the</a:t>
-            </a:r>
-            <a:r>
-              <a:rPr lang="de-DE" dirty="0" smtClean="0"/>
-              <a:t> </a:t>
-            </a:r>
-            <a:r>
-              <a:rPr lang="de-DE" dirty="0" err="1" smtClean="0"/>
-              <a:t>property</a:t>
-            </a:r>
-            <a:r>
-              <a:rPr lang="de-DE" dirty="0" smtClean="0"/>
-              <a:t> </a:t>
-            </a:r>
-            <a:r>
-              <a:rPr lang="de-DE" dirty="0" err="1" smtClean="0"/>
-              <a:t>or</a:t>
-            </a:r>
-            <a:r>
-              <a:rPr lang="de-DE" dirty="0" smtClean="0"/>
-              <a:t> </a:t>
-            </a:r>
-            <a:r>
-              <a:rPr lang="de-DE" dirty="0" err="1" smtClean="0"/>
-              <a:t>types</a:t>
-            </a:r>
-            <a:endParaRPr lang="de-DE" dirty="0" smtClean="0"/>
+              <a:rPr lang="en-US" dirty="0" smtClean="0"/>
+              <a:t>All fields and tables are named like the property or types</a:t>
+            </a:r>
           </a:p>
           <a:p>
             <a:pPr lvl="1"/>
             <a:r>
-              <a:rPr lang="de-DE" dirty="0" err="1" smtClean="0"/>
-              <a:t>You</a:t>
-            </a:r>
-            <a:r>
-              <a:rPr lang="de-DE" dirty="0" smtClean="0"/>
-              <a:t> </a:t>
-            </a:r>
-            <a:r>
-              <a:rPr lang="de-DE" dirty="0" err="1" smtClean="0"/>
-              <a:t>can</a:t>
-            </a:r>
-            <a:r>
-              <a:rPr lang="de-DE" dirty="0" smtClean="0"/>
-              <a:t> </a:t>
-            </a:r>
-            <a:r>
-              <a:rPr lang="de-DE" dirty="0" err="1" smtClean="0"/>
-              <a:t>override</a:t>
-            </a:r>
-            <a:r>
-              <a:rPr lang="de-DE" dirty="0" smtClean="0"/>
-              <a:t> </a:t>
-            </a:r>
-            <a:r>
-              <a:rPr lang="de-DE" dirty="0" err="1" smtClean="0"/>
-              <a:t>this</a:t>
-            </a:r>
-            <a:endParaRPr lang="de-DE" dirty="0" smtClean="0"/>
-          </a:p>
-          <a:p>
-            <a:r>
-              <a:rPr lang="de-DE" dirty="0" err="1" smtClean="0"/>
-              <a:t>You</a:t>
-            </a:r>
-            <a:r>
-              <a:rPr lang="de-DE" dirty="0" smtClean="0"/>
-              <a:t> </a:t>
-            </a:r>
-            <a:r>
-              <a:rPr lang="de-DE" dirty="0" err="1" smtClean="0"/>
-              <a:t>can</a:t>
-            </a:r>
-            <a:r>
-              <a:rPr lang="de-DE" dirty="0" smtClean="0"/>
-              <a:t> </a:t>
-            </a:r>
-            <a:r>
-              <a:rPr lang="de-DE" dirty="0" err="1" smtClean="0"/>
-              <a:t>define</a:t>
-            </a:r>
-            <a:r>
-              <a:rPr lang="de-DE" dirty="0" smtClean="0"/>
-              <a:t> </a:t>
-            </a:r>
-            <a:r>
-              <a:rPr lang="de-DE" dirty="0" err="1" smtClean="0"/>
-              <a:t>your</a:t>
-            </a:r>
-            <a:r>
-              <a:rPr lang="de-DE" dirty="0" smtClean="0"/>
-              <a:t> </a:t>
-            </a:r>
-            <a:r>
-              <a:rPr lang="de-DE" dirty="0" err="1" smtClean="0"/>
-              <a:t>own</a:t>
-            </a:r>
-            <a:r>
-              <a:rPr lang="de-DE" dirty="0" smtClean="0"/>
-              <a:t> </a:t>
-            </a:r>
-            <a:r>
-              <a:rPr lang="de-DE" dirty="0" err="1" smtClean="0"/>
-              <a:t>conventions</a:t>
-            </a:r>
-            <a:endParaRPr lang="de-DE" dirty="0"/>
+              <a:rPr lang="en-US" dirty="0" smtClean="0"/>
+              <a:t>You can override this</a:t>
+            </a:r>
+          </a:p>
+          <a:p>
+            <a:r>
+              <a:rPr lang="en-US" dirty="0" smtClean="0"/>
+              <a:t>You can define your own conventions</a:t>
+            </a:r>
+            <a:endParaRPr lang="en-US" dirty="0"/>
           </a:p>
         </p:txBody>
       </p:sp>
@@ -9154,7 +10490,7 @@
 </p:sld>
 </file>
 
-<file path=ppt/slides/slide14.xml><?xml version="1.0" encoding="utf-8"?>
+<file path=ppt/slides/slide19.xml><?xml version="1.0" encoding="utf-8"?>
 <p:sld xmlns:a="http://schemas.openxmlformats.org/drawingml/2006/main" xmlns:r="http://schemas.openxmlformats.org/officeDocument/2006/relationships" xmlns:p="http://schemas.openxmlformats.org/presentationml/2006/main">
   <p:cSld>
     <p:spTree>
@@ -9196,11 +10532,7 @@
             </a:r>
             <a:r>
               <a:rPr lang="de-DE" dirty="0" err="1" smtClean="0"/>
-              <a:t>U</a:t>
-            </a:r>
-            <a:r>
-              <a:rPr lang="de-DE" dirty="0" err="1" smtClean="0"/>
-              <a:t>sing</a:t>
+              <a:t>Using</a:t>
             </a:r>
             <a:r>
               <a:rPr lang="de-DE" dirty="0" smtClean="0"/>
@@ -9256,11 +10588,7 @@
             </a:r>
             <a:r>
               <a:rPr lang="de-DE" sz="2800" dirty="0" smtClean="0"/>
-              <a:t>) </a:t>
-            </a:r>
-            <a:r>
-              <a:rPr lang="de-DE" sz="2800" dirty="0" smtClean="0"/>
-              <a:t>= </a:t>
+              <a:t>) = </a:t>
             </a:r>
           </a:p>
           <a:p>
@@ -9299,11 +10627,7 @@
             </a:pPr>
             <a:r>
               <a:rPr lang="de-DE" sz="2800" dirty="0" smtClean="0"/>
-              <a:t>      </a:t>
-            </a:r>
-            <a:r>
-              <a:rPr lang="de-DE" sz="2800" dirty="0" smtClean="0"/>
-              <a:t>  |&gt; </a:t>
+              <a:t>        |&gt; </a:t>
             </a:r>
             <a:r>
               <a:rPr lang="de-DE" sz="2800" dirty="0" err="1" smtClean="0"/>
@@ -9327,28 +10651,16 @@
             </a:r>
             <a:r>
               <a:rPr lang="de-DE" sz="2800" dirty="0" smtClean="0"/>
-              <a:t> </a:t>
-            </a:r>
+              <a:t> = "1" @&gt;</a:t>
+            </a:r>
+          </a:p>
+          <a:p>
+            <a:pPr>
+              <a:buNone/>
+            </a:pPr>
             <a:r>
               <a:rPr lang="de-DE" sz="2800" dirty="0" smtClean="0"/>
-              <a:t>= "1" @&gt;</a:t>
-            </a:r>
-          </a:p>
-          <a:p>
-            <a:pPr>
-              <a:buNone/>
-            </a:pPr>
-            <a:r>
-              <a:rPr lang="de-DE" sz="2800" dirty="0" smtClean="0"/>
-              <a:t>      </a:t>
-            </a:r>
-            <a:r>
-              <a:rPr lang="de-DE" sz="2800" dirty="0" smtClean="0"/>
-              <a:t>  |&gt; </a:t>
-            </a:r>
-            <a:r>
-              <a:rPr lang="de-DE" sz="2800" dirty="0" smtClean="0"/>
-              <a:t>Query.map &lt;@</a:t>
+              <a:t>        |&gt; Query.map &lt;@</a:t>
             </a:r>
             <a:r>
               <a:rPr lang="de-DE" sz="2800" dirty="0" err="1" smtClean="0"/>
@@ -9364,24 +10676,16 @@
             </a:r>
             <a:r>
               <a:rPr lang="de-DE" sz="2800" dirty="0" smtClean="0"/>
-              <a:t>) </a:t>
-            </a:r>
+              <a:t>) @&gt;</a:t>
+            </a:r>
+          </a:p>
+          <a:p>
+            <a:pPr>
+              <a:buNone/>
+            </a:pPr>
             <a:r>
               <a:rPr lang="de-DE" sz="2800" dirty="0" smtClean="0"/>
-              <a:t>@&gt;</a:t>
-            </a:r>
-          </a:p>
-          <a:p>
-            <a:pPr>
-              <a:buNone/>
-            </a:pPr>
-            <a:r>
-              <a:rPr lang="de-DE" sz="2800" dirty="0" smtClean="0"/>
-              <a:t>      </a:t>
-            </a:r>
-            <a:r>
-              <a:rPr lang="de-DE" sz="2800" dirty="0" smtClean="0"/>
-              <a:t>  |&gt; </a:t>
+              <a:t>        |&gt; </a:t>
             </a:r>
             <a:r>
               <a:rPr lang="de-DE" sz="2800" dirty="0" err="1" smtClean="0"/>
@@ -9391,7 +10695,6 @@
               <a:rPr lang="de-DE" sz="2800" dirty="0" smtClean="0"/>
               <a:t> </a:t>
             </a:r>
-            <a:endParaRPr lang="de-DE" sz="2800" dirty="0" smtClean="0"/>
           </a:p>
           <a:p>
             <a:pPr>
@@ -9443,7 +10746,7 @@
 </p:sld>
 </file>
 
-<file path=ppt/slides/slide15.xml><?xml version="1.0" encoding="utf-8"?>
+<file path=ppt/slides/slide2.xml><?xml version="1.0" encoding="utf-8"?>
 <p:sld xmlns:a="http://schemas.openxmlformats.org/drawingml/2006/main" xmlns:r="http://schemas.openxmlformats.org/officeDocument/2006/relationships" xmlns:p="http://schemas.openxmlformats.org/presentationml/2006/main">
   <p:cSld>
     <p:spTree>
@@ -9462,55 +10765,12 @@
       </p:grpSpPr>
       <p:sp>
         <p:nvSpPr>
-          <p:cNvPr id="7" name="Titel 6"/>
+          <p:cNvPr id="2" name="Titel 1"/>
           <p:cNvSpPr>
             <a:spLocks noGrp="1"/>
           </p:cNvSpPr>
           <p:nvPr>
             <p:ph type="title"/>
-          </p:nvPr>
-        </p:nvSpPr>
-        <p:spPr/>
-        <p:txBody>
-          <a:bodyPr/>
-          <a:lstStyle/>
-          <a:p>
-            <a:r>
-              <a:rPr lang="de-DE" dirty="0" err="1" smtClean="0"/>
-              <a:t>Queries</a:t>
-            </a:r>
-            <a:r>
-              <a:rPr lang="de-DE" dirty="0" smtClean="0"/>
-              <a:t> – </a:t>
-            </a:r>
-            <a:r>
-              <a:rPr lang="de-DE" dirty="0" err="1" smtClean="0"/>
-              <a:t>U</a:t>
-            </a:r>
-            <a:r>
-              <a:rPr lang="de-DE" dirty="0" err="1" smtClean="0"/>
-              <a:t>sing</a:t>
-            </a:r>
-            <a:r>
-              <a:rPr lang="de-DE" dirty="0" smtClean="0"/>
-              <a:t> </a:t>
-            </a:r>
-            <a:r>
-              <a:rPr lang="de-DE" dirty="0" err="1" smtClean="0"/>
-              <a:t>monads</a:t>
-            </a:r>
-            <a:endParaRPr lang="de-DE" dirty="0"/>
-          </a:p>
-        </p:txBody>
-      </p:sp>
-      <p:sp>
-        <p:nvSpPr>
-          <p:cNvPr id="8" name="Inhaltsplatzhalter 7"/>
-          <p:cNvSpPr>
-            <a:spLocks noGrp="1"/>
-          </p:cNvSpPr>
-          <p:nvPr>
-            <p:ph idx="1"/>
           </p:nvPr>
         </p:nvSpPr>
         <p:spPr/>
@@ -9520,6 +10780,140 @@
           </a:bodyPr>
           <a:lstStyle/>
           <a:p>
+            <a:r>
+              <a:rPr lang="de-DE" sz="6000" dirty="0" smtClean="0"/>
+              <a:t>Agenda</a:t>
+            </a:r>
+            <a:endParaRPr lang="de-DE" sz="6000" dirty="0"/>
+          </a:p>
+        </p:txBody>
+      </p:sp>
+      <p:sp>
+        <p:nvSpPr>
+          <p:cNvPr id="3" name="Inhaltsplatzhalter 2"/>
+          <p:cNvSpPr>
+            <a:spLocks noGrp="1"/>
+          </p:cNvSpPr>
+          <p:nvPr>
+            <p:ph idx="1"/>
+          </p:nvPr>
+        </p:nvSpPr>
+        <p:spPr/>
+        <p:txBody>
+          <a:bodyPr>
+            <a:noAutofit/>
+          </a:bodyPr>
+          <a:lstStyle/>
+          <a:p>
+            <a:r>
+              <a:rPr lang="en-US" sz="4800" dirty="0" smtClean="0"/>
+              <a:t>FAKE – F# Make</a:t>
+            </a:r>
+          </a:p>
+          <a:p>
+            <a:r>
+              <a:rPr lang="en-US" sz="4800" dirty="0" err="1" smtClean="0"/>
+              <a:t>NaturalSpec</a:t>
+            </a:r>
+            <a:endParaRPr lang="en-US" sz="4800" dirty="0" smtClean="0"/>
+          </a:p>
+          <a:p>
+            <a:r>
+              <a:rPr lang="en-US" sz="4800" dirty="0" err="1" smtClean="0"/>
+              <a:t>FunctionalNHibernate</a:t>
+            </a:r>
+            <a:endParaRPr lang="en-US" sz="4400" dirty="0" smtClean="0"/>
+          </a:p>
+        </p:txBody>
+      </p:sp>
+    </p:spTree>
+  </p:cSld>
+  <p:clrMapOvr>
+    <a:masterClrMapping/>
+  </p:clrMapOvr>
+  <p:timing>
+    <p:tnLst>
+      <p:par>
+        <p:cTn id="1" dur="indefinite" restart="never" nodeType="tmRoot"/>
+      </p:par>
+    </p:tnLst>
+  </p:timing>
+</p:sld>
+</file>
+
+<file path=ppt/slides/slide20.xml><?xml version="1.0" encoding="utf-8"?>
+<p:sld xmlns:a="http://schemas.openxmlformats.org/drawingml/2006/main" xmlns:r="http://schemas.openxmlformats.org/officeDocument/2006/relationships" xmlns:p="http://schemas.openxmlformats.org/presentationml/2006/main">
+  <p:cSld>
+    <p:spTree>
+      <p:nvGrpSpPr>
+        <p:cNvPr id="1" name=""/>
+        <p:cNvGrpSpPr/>
+        <p:nvPr/>
+      </p:nvGrpSpPr>
+      <p:grpSpPr>
+        <a:xfrm>
+          <a:off x="0" y="0"/>
+          <a:ext cx="0" cy="0"/>
+          <a:chOff x="0" y="0"/>
+          <a:chExt cx="0" cy="0"/>
+        </a:xfrm>
+      </p:grpSpPr>
+      <p:sp>
+        <p:nvSpPr>
+          <p:cNvPr id="7" name="Titel 6"/>
+          <p:cNvSpPr>
+            <a:spLocks noGrp="1"/>
+          </p:cNvSpPr>
+          <p:nvPr>
+            <p:ph type="title"/>
+          </p:nvPr>
+        </p:nvSpPr>
+        <p:spPr/>
+        <p:txBody>
+          <a:bodyPr/>
+          <a:lstStyle/>
+          <a:p>
+            <a:r>
+              <a:rPr lang="de-DE" dirty="0" err="1" smtClean="0"/>
+              <a:t>Queries</a:t>
+            </a:r>
+            <a:r>
+              <a:rPr lang="de-DE" dirty="0" smtClean="0"/>
+              <a:t> – </a:t>
+            </a:r>
+            <a:r>
+              <a:rPr lang="de-DE" dirty="0" err="1" smtClean="0"/>
+              <a:t>Using</a:t>
+            </a:r>
+            <a:r>
+              <a:rPr lang="de-DE" dirty="0" smtClean="0"/>
+              <a:t> </a:t>
+            </a:r>
+            <a:r>
+              <a:rPr lang="de-DE" dirty="0" err="1" smtClean="0"/>
+              <a:t>monads</a:t>
+            </a:r>
+            <a:endParaRPr lang="de-DE" dirty="0"/>
+          </a:p>
+        </p:txBody>
+      </p:sp>
+      <p:sp>
+        <p:nvSpPr>
+          <p:cNvPr id="8" name="Inhaltsplatzhalter 7"/>
+          <p:cNvSpPr>
+            <a:spLocks noGrp="1"/>
+          </p:cNvSpPr>
+          <p:nvPr>
+            <p:ph idx="1"/>
+          </p:nvPr>
+        </p:nvSpPr>
+        <p:spPr/>
+        <p:txBody>
+          <a:bodyPr>
+            <a:normAutofit/>
+          </a:bodyPr>
+          <a:lstStyle/>
+          <a:p>
             <a:pPr>
               <a:buNone/>
             </a:pPr>
@@ -9636,7 +11030,6 @@
               <a:rPr lang="de-DE" sz="2800" dirty="0" smtClean="0"/>
               <a:t> } </a:t>
             </a:r>
-            <a:endParaRPr lang="de-DE" sz="2800" dirty="0" smtClean="0"/>
           </a:p>
           <a:p>
             <a:pPr>
@@ -9644,11 +11037,7 @@
             </a:pPr>
             <a:r>
               <a:rPr lang="de-DE" sz="2800" dirty="0" smtClean="0"/>
-              <a:t> </a:t>
-            </a:r>
-            <a:r>
-              <a:rPr lang="de-DE" sz="2800" dirty="0" smtClean="0"/>
-              <a:t>         |&gt; </a:t>
+              <a:t>          |&gt; </a:t>
             </a:r>
             <a:r>
               <a:rPr lang="de-DE" sz="2800" dirty="0" err="1" smtClean="0"/>
@@ -9815,7 +11204,7 @@
 </p:sld>
 </file>
 
-<file path=ppt/slides/slide16.xml><?xml version="1.0" encoding="utf-8"?>
+<file path=ppt/slides/slide21.xml><?xml version="1.0" encoding="utf-8"?>
 <p:sld xmlns:a="http://schemas.openxmlformats.org/drawingml/2006/main" xmlns:r="http://schemas.openxmlformats.org/officeDocument/2006/relationships" xmlns:p="http://schemas.openxmlformats.org/presentationml/2006/main">
   <p:cSld>
     <p:spTree>
@@ -9857,11 +11246,7 @@
             </a:r>
             <a:r>
               <a:rPr lang="de-DE" dirty="0" err="1" smtClean="0"/>
-              <a:t>U</a:t>
-            </a:r>
-            <a:r>
-              <a:rPr lang="de-DE" dirty="0" err="1" smtClean="0"/>
-              <a:t>sing</a:t>
+              <a:t>Using</a:t>
             </a:r>
             <a:r>
               <a:rPr lang="de-DE" dirty="0" smtClean="0"/>
@@ -9967,11 +11352,7 @@
             </a:r>
             <a:r>
               <a:rPr lang="de-DE" sz="2700" dirty="0" smtClean="0"/>
-              <a:t> </a:t>
-            </a:r>
-            <a:r>
-              <a:rPr lang="de-DE" sz="2700" dirty="0" smtClean="0"/>
-              <a:t>in </a:t>
+              <a:t> in </a:t>
             </a:r>
             <a:r>
               <a:rPr lang="de-DE" sz="2700" dirty="0" err="1" smtClean="0"/>
@@ -10026,15 +11407,7 @@
             </a:r>
             <a:r>
               <a:rPr lang="de-DE" sz="2700" dirty="0" smtClean="0"/>
-              <a:t> "</a:t>
-            </a:r>
-            <a:r>
-              <a:rPr lang="de-DE" sz="2700" dirty="0" smtClean="0"/>
-              <a:t>PG: </a:t>
-            </a:r>
-            <a:r>
-              <a:rPr lang="de-DE" sz="2700" dirty="0" smtClean="0"/>
-              <a:t>%s -&gt; Balance %0.2f" </a:t>
+              <a:t> "PG: %s -&gt; Balance %0.2f" </a:t>
             </a:r>
             <a:r>
               <a:rPr lang="de-DE" sz="2700" dirty="0" err="1" smtClean="0"/>
@@ -10052,7 +11425,6 @@
               <a:rPr lang="de-DE" sz="2700" dirty="0" smtClean="0"/>
               <a:t> }</a:t>
             </a:r>
-            <a:endParaRPr lang="de-DE" sz="2700" dirty="0" smtClean="0"/>
           </a:p>
           <a:p>
             <a:pPr>
@@ -10060,15 +11432,7 @@
             </a:pPr>
             <a:r>
               <a:rPr lang="de-DE" sz="2700" dirty="0" smtClean="0"/>
-              <a:t>       </a:t>
-            </a:r>
-            <a:r>
-              <a:rPr lang="de-DE" sz="2700" dirty="0" smtClean="0"/>
-              <a:t>       </a:t>
-            </a:r>
-            <a:r>
-              <a:rPr lang="de-DE" sz="2700" dirty="0" smtClean="0"/>
-              <a:t>|&gt; </a:t>
+              <a:t>              |&gt; </a:t>
             </a:r>
             <a:r>
               <a:rPr lang="de-DE" sz="2700" dirty="0" err="1" smtClean="0"/>
@@ -10097,7 +11461,7 @@
 </p:sld>
 </file>
 
-<file path=ppt/slides/slide17.xml><?xml version="1.0" encoding="utf-8"?>
+<file path=ppt/slides/slide22.xml><?xml version="1.0" encoding="utf-8"?>
 <p:sld xmlns:a="http://schemas.openxmlformats.org/drawingml/2006/main" xmlns:r="http://schemas.openxmlformats.org/officeDocument/2006/relationships" xmlns:p="http://schemas.openxmlformats.org/presentationml/2006/main">
   <p:cSld>
     <p:spTree>
@@ -10203,24 +11567,16 @@
             </a:r>
             <a:r>
               <a:rPr lang="de-DE" dirty="0" smtClean="0"/>
-              <a:t> </a:t>
-            </a:r>
+              <a:t> invoice2 } </a:t>
+            </a:r>
+          </a:p>
+          <a:p>
+            <a:pPr>
+              <a:buNone/>
+            </a:pPr>
             <a:r>
               <a:rPr lang="de-DE" dirty="0" smtClean="0"/>
-              <a:t>invoice2 } </a:t>
-            </a:r>
-          </a:p>
-          <a:p>
-            <a:pPr>
-              <a:buNone/>
-            </a:pPr>
-            <a:r>
-              <a:rPr lang="de-DE" dirty="0" smtClean="0"/>
-              <a:t> </a:t>
-            </a:r>
-            <a:r>
-              <a:rPr lang="de-DE" dirty="0" smtClean="0"/>
-              <a:t>          |&gt; </a:t>
+              <a:t>           |&gt; </a:t>
             </a:r>
             <a:r>
               <a:rPr lang="de-DE" dirty="0" err="1" smtClean="0"/>
@@ -10399,7 +11755,7 @@
 </p:sld>
 </file>
 
-<file path=ppt/slides/slide2.xml><?xml version="1.0" encoding="utf-8"?>
+<file path=ppt/slides/slide23.xml><?xml version="1.0" encoding="utf-8"?>
 <p:sld xmlns:a="http://schemas.openxmlformats.org/drawingml/2006/main" xmlns:r="http://schemas.openxmlformats.org/officeDocument/2006/relationships" xmlns:p="http://schemas.openxmlformats.org/presentationml/2006/main">
   <p:cSld>
     <p:spTree>
@@ -10428,16 +11784,14 @@
         </p:nvSpPr>
         <p:spPr/>
         <p:txBody>
-          <a:bodyPr>
-            <a:normAutofit/>
-          </a:bodyPr>
+          <a:bodyPr/>
           <a:lstStyle/>
           <a:p>
             <a:r>
-              <a:rPr lang="de-DE" sz="6000" dirty="0" smtClean="0"/>
-              <a:t>Agenda</a:t>
-            </a:r>
-            <a:endParaRPr lang="de-DE" sz="6000" dirty="0"/>
+              <a:rPr lang="en-US" dirty="0" smtClean="0"/>
+              <a:t>Demo</a:t>
+            </a:r>
+            <a:endParaRPr lang="en-US" dirty="0"/>
           </a:p>
         </p:txBody>
       </p:sp>
@@ -10453,29 +11807,14 @@
         </p:nvSpPr>
         <p:spPr/>
         <p:txBody>
-          <a:bodyPr>
-            <a:noAutofit/>
-          </a:bodyPr>
+          <a:bodyPr/>
           <a:lstStyle/>
           <a:p>
             <a:r>
-              <a:rPr lang="en-US" sz="4800" dirty="0" smtClean="0"/>
-              <a:t>FAKE – F# Make</a:t>
-            </a:r>
-          </a:p>
-          <a:p>
-            <a:r>
-              <a:rPr lang="en-US" sz="4800" dirty="0" err="1" smtClean="0"/>
-              <a:t>NaturalSpec</a:t>
-            </a:r>
-            <a:endParaRPr lang="en-US" sz="4800" dirty="0" smtClean="0"/>
-          </a:p>
-          <a:p>
-            <a:r>
-              <a:rPr lang="en-US" sz="4800" dirty="0" err="1" smtClean="0"/>
+              <a:rPr lang="en-US" dirty="0" err="1" smtClean="0"/>
               <a:t>FunctionalNHibernate</a:t>
             </a:r>
-            <a:endParaRPr lang="en-US" sz="4400" dirty="0" smtClean="0"/>
+            <a:endParaRPr lang="en-US" dirty="0" smtClean="0"/>
           </a:p>
         </p:txBody>
       </p:sp>
@@ -10551,7 +11890,7 @@
         <p:spPr/>
         <p:txBody>
           <a:bodyPr>
-            <a:normAutofit fontScale="92500" lnSpcReduction="10000"/>
+            <a:normAutofit lnSpcReduction="10000"/>
           </a:bodyPr>
           <a:lstStyle/>
           <a:p>
@@ -10564,6 +11903,18 @@
             <a:pPr lvl="1"/>
             <a:r>
               <a:rPr lang="en-US" dirty="0" smtClean="0"/>
+              <a:t>“Get rid of the XML pain</a:t>
+            </a:r>
+            <a:r>
+              <a:rPr lang="en-US" dirty="0" smtClean="0"/>
+              <a:t>”</a:t>
+            </a:r>
+            <a:endParaRPr lang="en-US" dirty="0" smtClean="0"/>
+          </a:p>
+          <a:p>
+            <a:pPr lvl="1"/>
+            <a:r>
+              <a:rPr lang="en-US" dirty="0" smtClean="0"/>
               <a:t>Uses vanilla .</a:t>
             </a:r>
             <a:r>
@@ -10579,21 +11930,11 @@
             <a:pPr lvl="1"/>
             <a:r>
               <a:rPr lang="en-US" dirty="0" smtClean="0"/>
-              <a:t>Easy syntax (no XML pain) </a:t>
-            </a:r>
-          </a:p>
-          <a:p>
-            <a:pPr lvl="1"/>
+              <a:t>Full power of .NET </a:t>
+            </a:r>
             <a:r>
               <a:rPr lang="en-US" dirty="0" smtClean="0"/>
-              <a:t>Full power of .NET Framework</a:t>
-            </a:r>
-          </a:p>
-          <a:p>
-            <a:pPr lvl="1"/>
-            <a:r>
-              <a:rPr lang="en-US" dirty="0" smtClean="0"/>
-              <a:t>Extensible via .NET assemblies</a:t>
+              <a:t>Framework</a:t>
             </a:r>
           </a:p>
           <a:p>
@@ -10604,31 +11945,20 @@
             </a:r>
             <a:r>
               <a:rPr lang="en-US" dirty="0" smtClean="0"/>
-              <a:t> support</a:t>
+              <a:t> </a:t>
+            </a:r>
+            <a:r>
+              <a:rPr lang="en-US" dirty="0" smtClean="0"/>
+              <a:t>support</a:t>
             </a:r>
           </a:p>
           <a:p>
             <a:pPr lvl="1"/>
             <a:r>
               <a:rPr lang="en-US" dirty="0" smtClean="0"/>
-              <a:t>Visual Studio Debugger (missing in </a:t>
-            </a:r>
-            <a:r>
-              <a:rPr lang="en-US" dirty="0" err="1" smtClean="0"/>
-              <a:t>NAnt</a:t>
-            </a:r>
-            <a:r>
-              <a:rPr lang="en-US" dirty="0" smtClean="0"/>
-              <a:t> or </a:t>
-            </a:r>
-            <a:r>
-              <a:rPr lang="en-US" dirty="0" err="1" smtClean="0"/>
-              <a:t>MSBuild</a:t>
-            </a:r>
-            <a:r>
-              <a:rPr lang="en-US" dirty="0" smtClean="0"/>
-              <a:t>)</a:t>
-            </a:r>
+              <a:t>Visual Studio Debugger </a:t>
+            </a:r>
+            <a:endParaRPr lang="en-US" dirty="0" smtClean="0"/>
           </a:p>
           <a:p>
             <a:pPr lvl="1"/>
@@ -10668,7 +11998,396 @@
   <p:timing>
     <p:tnLst>
       <p:par>
-        <p:cTn id="1" dur="indefinite" restart="never" nodeType="tmRoot"/>
+        <p:cTn id="1" dur="indefinite" restart="never" nodeType="tmRoot">
+          <p:childTnLst>
+            <p:seq concurrent="1" nextAc="seek">
+              <p:cTn id="2" dur="indefinite" nodeType="mainSeq">
+                <p:childTnLst>
+                  <p:par>
+                    <p:cTn id="3" fill="hold">
+                      <p:stCondLst>
+                        <p:cond delay="indefinite"/>
+                      </p:stCondLst>
+                      <p:childTnLst>
+                        <p:par>
+                          <p:cTn id="4" fill="hold">
+                            <p:stCondLst>
+                              <p:cond delay="0"/>
+                            </p:stCondLst>
+                            <p:childTnLst>
+                              <p:par>
+                                <p:cTn id="5" presetID="3" presetClass="entr" presetSubtype="10" fill="hold" nodeType="clickEffect">
+                                  <p:stCondLst>
+                                    <p:cond delay="0"/>
+                                  </p:stCondLst>
+                                  <p:childTnLst>
+                                    <p:set>
+                                      <p:cBhvr>
+                                        <p:cTn id="6" dur="1" fill="hold">
+                                          <p:stCondLst>
+                                            <p:cond delay="0"/>
+                                          </p:stCondLst>
+                                        </p:cTn>
+                                        <p:tgtEl>
+                                          <p:spTgt spid="3">
+                                            <p:txEl>
+                                              <p:pRg st="1" end="1"/>
+                                            </p:txEl>
+                                          </p:spTgt>
+                                        </p:tgtEl>
+                                        <p:attrNameLst>
+                                          <p:attrName>style.visibility</p:attrName>
+                                        </p:attrNameLst>
+                                      </p:cBhvr>
+                                      <p:to>
+                                        <p:strVal val="visible"/>
+                                      </p:to>
+                                    </p:set>
+                                    <p:animEffect transition="in" filter="blinds(horizontal)">
+                                      <p:cBhvr>
+                                        <p:cTn id="7" dur="500"/>
+                                        <p:tgtEl>
+                                          <p:spTgt spid="3">
+                                            <p:txEl>
+                                              <p:pRg st="1" end="1"/>
+                                            </p:txEl>
+                                          </p:spTgt>
+                                        </p:tgtEl>
+                                      </p:cBhvr>
+                                    </p:animEffect>
+                                  </p:childTnLst>
+                                </p:cTn>
+                              </p:par>
+                            </p:childTnLst>
+                          </p:cTn>
+                        </p:par>
+                      </p:childTnLst>
+                    </p:cTn>
+                  </p:par>
+                  <p:par>
+                    <p:cTn id="8" fill="hold">
+                      <p:stCondLst>
+                        <p:cond delay="indefinite"/>
+                      </p:stCondLst>
+                      <p:childTnLst>
+                        <p:par>
+                          <p:cTn id="9" fill="hold">
+                            <p:stCondLst>
+                              <p:cond delay="0"/>
+                            </p:stCondLst>
+                            <p:childTnLst>
+                              <p:par>
+                                <p:cTn id="10" presetID="3" presetClass="entr" presetSubtype="10" fill="hold" nodeType="clickEffect">
+                                  <p:stCondLst>
+                                    <p:cond delay="0"/>
+                                  </p:stCondLst>
+                                  <p:childTnLst>
+                                    <p:set>
+                                      <p:cBhvr>
+                                        <p:cTn id="11" dur="1" fill="hold">
+                                          <p:stCondLst>
+                                            <p:cond delay="0"/>
+                                          </p:stCondLst>
+                                        </p:cTn>
+                                        <p:tgtEl>
+                                          <p:spTgt spid="3">
+                                            <p:txEl>
+                                              <p:pRg st="2" end="2"/>
+                                            </p:txEl>
+                                          </p:spTgt>
+                                        </p:tgtEl>
+                                        <p:attrNameLst>
+                                          <p:attrName>style.visibility</p:attrName>
+                                        </p:attrNameLst>
+                                      </p:cBhvr>
+                                      <p:to>
+                                        <p:strVal val="visible"/>
+                                      </p:to>
+                                    </p:set>
+                                    <p:animEffect transition="in" filter="blinds(horizontal)">
+                                      <p:cBhvr>
+                                        <p:cTn id="12" dur="500"/>
+                                        <p:tgtEl>
+                                          <p:spTgt spid="3">
+                                            <p:txEl>
+                                              <p:pRg st="2" end="2"/>
+                                            </p:txEl>
+                                          </p:spTgt>
+                                        </p:tgtEl>
+                                      </p:cBhvr>
+                                    </p:animEffect>
+                                  </p:childTnLst>
+                                </p:cTn>
+                              </p:par>
+                            </p:childTnLst>
+                          </p:cTn>
+                        </p:par>
+                      </p:childTnLst>
+                    </p:cTn>
+                  </p:par>
+                  <p:par>
+                    <p:cTn id="13" fill="hold">
+                      <p:stCondLst>
+                        <p:cond delay="indefinite"/>
+                      </p:stCondLst>
+                      <p:childTnLst>
+                        <p:par>
+                          <p:cTn id="14" fill="hold">
+                            <p:stCondLst>
+                              <p:cond delay="0"/>
+                            </p:stCondLst>
+                            <p:childTnLst>
+                              <p:par>
+                                <p:cTn id="15" presetID="3" presetClass="entr" presetSubtype="10" fill="hold" nodeType="clickEffect">
+                                  <p:stCondLst>
+                                    <p:cond delay="0"/>
+                                  </p:stCondLst>
+                                  <p:childTnLst>
+                                    <p:set>
+                                      <p:cBhvr>
+                                        <p:cTn id="16" dur="1" fill="hold">
+                                          <p:stCondLst>
+                                            <p:cond delay="0"/>
+                                          </p:stCondLst>
+                                        </p:cTn>
+                                        <p:tgtEl>
+                                          <p:spTgt spid="3">
+                                            <p:txEl>
+                                              <p:pRg st="3" end="3"/>
+                                            </p:txEl>
+                                          </p:spTgt>
+                                        </p:tgtEl>
+                                        <p:attrNameLst>
+                                          <p:attrName>style.visibility</p:attrName>
+                                        </p:attrNameLst>
+                                      </p:cBhvr>
+                                      <p:to>
+                                        <p:strVal val="visible"/>
+                                      </p:to>
+                                    </p:set>
+                                    <p:animEffect transition="in" filter="blinds(horizontal)">
+                                      <p:cBhvr>
+                                        <p:cTn id="17" dur="500"/>
+                                        <p:tgtEl>
+                                          <p:spTgt spid="3">
+                                            <p:txEl>
+                                              <p:pRg st="3" end="3"/>
+                                            </p:txEl>
+                                          </p:spTgt>
+                                        </p:tgtEl>
+                                      </p:cBhvr>
+                                    </p:animEffect>
+                                  </p:childTnLst>
+                                </p:cTn>
+                              </p:par>
+                            </p:childTnLst>
+                          </p:cTn>
+                        </p:par>
+                      </p:childTnLst>
+                    </p:cTn>
+                  </p:par>
+                  <p:par>
+                    <p:cTn id="18" fill="hold">
+                      <p:stCondLst>
+                        <p:cond delay="indefinite"/>
+                      </p:stCondLst>
+                      <p:childTnLst>
+                        <p:par>
+                          <p:cTn id="19" fill="hold">
+                            <p:stCondLst>
+                              <p:cond delay="0"/>
+                            </p:stCondLst>
+                            <p:childTnLst>
+                              <p:par>
+                                <p:cTn id="20" presetID="3" presetClass="entr" presetSubtype="10" fill="hold" nodeType="clickEffect">
+                                  <p:stCondLst>
+                                    <p:cond delay="0"/>
+                                  </p:stCondLst>
+                                  <p:childTnLst>
+                                    <p:set>
+                                      <p:cBhvr>
+                                        <p:cTn id="21" dur="1" fill="hold">
+                                          <p:stCondLst>
+                                            <p:cond delay="0"/>
+                                          </p:stCondLst>
+                                        </p:cTn>
+                                        <p:tgtEl>
+                                          <p:spTgt spid="3">
+                                            <p:txEl>
+                                              <p:pRg st="4" end="4"/>
+                                            </p:txEl>
+                                          </p:spTgt>
+                                        </p:tgtEl>
+                                        <p:attrNameLst>
+                                          <p:attrName>style.visibility</p:attrName>
+                                        </p:attrNameLst>
+                                      </p:cBhvr>
+                                      <p:to>
+                                        <p:strVal val="visible"/>
+                                      </p:to>
+                                    </p:set>
+                                    <p:animEffect transition="in" filter="blinds(horizontal)">
+                                      <p:cBhvr>
+                                        <p:cTn id="22" dur="500"/>
+                                        <p:tgtEl>
+                                          <p:spTgt spid="3">
+                                            <p:txEl>
+                                              <p:pRg st="4" end="4"/>
+                                            </p:txEl>
+                                          </p:spTgt>
+                                        </p:tgtEl>
+                                      </p:cBhvr>
+                                    </p:animEffect>
+                                  </p:childTnLst>
+                                </p:cTn>
+                              </p:par>
+                            </p:childTnLst>
+                          </p:cTn>
+                        </p:par>
+                      </p:childTnLst>
+                    </p:cTn>
+                  </p:par>
+                  <p:par>
+                    <p:cTn id="23" fill="hold">
+                      <p:stCondLst>
+                        <p:cond delay="indefinite"/>
+                      </p:stCondLst>
+                      <p:childTnLst>
+                        <p:par>
+                          <p:cTn id="24" fill="hold">
+                            <p:stCondLst>
+                              <p:cond delay="0"/>
+                            </p:stCondLst>
+                            <p:childTnLst>
+                              <p:par>
+                                <p:cTn id="25" presetID="3" presetClass="entr" presetSubtype="10" fill="hold" nodeType="clickEffect">
+                                  <p:stCondLst>
+                                    <p:cond delay="0"/>
+                                  </p:stCondLst>
+                                  <p:childTnLst>
+                                    <p:set>
+                                      <p:cBhvr>
+                                        <p:cTn id="26" dur="1" fill="hold">
+                                          <p:stCondLst>
+                                            <p:cond delay="0"/>
+                                          </p:stCondLst>
+                                        </p:cTn>
+                                        <p:tgtEl>
+                                          <p:spTgt spid="3">
+                                            <p:txEl>
+                                              <p:pRg st="5" end="5"/>
+                                            </p:txEl>
+                                          </p:spTgt>
+                                        </p:tgtEl>
+                                        <p:attrNameLst>
+                                          <p:attrName>style.visibility</p:attrName>
+                                        </p:attrNameLst>
+                                      </p:cBhvr>
+                                      <p:to>
+                                        <p:strVal val="visible"/>
+                                      </p:to>
+                                    </p:set>
+                                    <p:animEffect transition="in" filter="blinds(horizontal)">
+                                      <p:cBhvr>
+                                        <p:cTn id="27" dur="500"/>
+                                        <p:tgtEl>
+                                          <p:spTgt spid="3">
+                                            <p:txEl>
+                                              <p:pRg st="5" end="5"/>
+                                            </p:txEl>
+                                          </p:spTgt>
+                                        </p:tgtEl>
+                                      </p:cBhvr>
+                                    </p:animEffect>
+                                  </p:childTnLst>
+                                </p:cTn>
+                              </p:par>
+                            </p:childTnLst>
+                          </p:cTn>
+                        </p:par>
+                      </p:childTnLst>
+                    </p:cTn>
+                  </p:par>
+                  <p:par>
+                    <p:cTn id="28" fill="hold">
+                      <p:stCondLst>
+                        <p:cond delay="indefinite"/>
+                      </p:stCondLst>
+                      <p:childTnLst>
+                        <p:par>
+                          <p:cTn id="29" fill="hold">
+                            <p:stCondLst>
+                              <p:cond delay="0"/>
+                            </p:stCondLst>
+                            <p:childTnLst>
+                              <p:par>
+                                <p:cTn id="30" presetID="3" presetClass="entr" presetSubtype="10" fill="hold" nodeType="clickEffect">
+                                  <p:stCondLst>
+                                    <p:cond delay="0"/>
+                                  </p:stCondLst>
+                                  <p:childTnLst>
+                                    <p:set>
+                                      <p:cBhvr>
+                                        <p:cTn id="31" dur="1" fill="hold">
+                                          <p:stCondLst>
+                                            <p:cond delay="0"/>
+                                          </p:stCondLst>
+                                        </p:cTn>
+                                        <p:tgtEl>
+                                          <p:spTgt spid="3">
+                                            <p:txEl>
+                                              <p:pRg st="6" end="6"/>
+                                            </p:txEl>
+                                          </p:spTgt>
+                                        </p:tgtEl>
+                                        <p:attrNameLst>
+                                          <p:attrName>style.visibility</p:attrName>
+                                        </p:attrNameLst>
+                                      </p:cBhvr>
+                                      <p:to>
+                                        <p:strVal val="visible"/>
+                                      </p:to>
+                                    </p:set>
+                                    <p:animEffect transition="in" filter="blinds(horizontal)">
+                                      <p:cBhvr>
+                                        <p:cTn id="32" dur="500"/>
+                                        <p:tgtEl>
+                                          <p:spTgt spid="3">
+                                            <p:txEl>
+                                              <p:pRg st="6" end="6"/>
+                                            </p:txEl>
+                                          </p:spTgt>
+                                        </p:tgtEl>
+                                      </p:cBhvr>
+                                    </p:animEffect>
+                                  </p:childTnLst>
+                                </p:cTn>
+                              </p:par>
+                            </p:childTnLst>
+                          </p:cTn>
+                        </p:par>
+                      </p:childTnLst>
+                    </p:cTn>
+                  </p:par>
+                </p:childTnLst>
+              </p:cTn>
+              <p:prevCondLst>
+                <p:cond evt="onPrev" delay="0">
+                  <p:tgtEl>
+                    <p:sldTgt/>
+                  </p:tgtEl>
+                </p:cond>
+              </p:prevCondLst>
+              <p:nextCondLst>
+                <p:cond evt="onNext" delay="0">
+                  <p:tgtEl>
+                    <p:sldTgt/>
+                  </p:tgtEl>
+                </p:cond>
+              </p:nextCondLst>
+            </p:seq>
+          </p:childTnLst>
+        </p:cTn>
       </p:par>
     </p:tnLst>
   </p:timing>
@@ -10740,15 +12459,7 @@
           <a:p>
             <a:r>
               <a:rPr lang="en-US" dirty="0" smtClean="0"/>
-              <a:t>Define build tasks (</a:t>
-            </a:r>
-            <a:r>
-              <a:rPr lang="en-US" dirty="0" err="1" smtClean="0"/>
-              <a:t>usalliy</a:t>
-            </a:r>
-            <a:r>
-              <a:rPr lang="en-US" dirty="0" smtClean="0"/>
-              <a:t> called „targets“)</a:t>
+              <a:t>Define build tasks (usually called „targets“)</a:t>
             </a:r>
           </a:p>
           <a:p>
@@ -10803,7 +12514,299 @@
   <p:timing>
     <p:tnLst>
       <p:par>
-        <p:cTn id="1" dur="indefinite" restart="never" nodeType="tmRoot"/>
+        <p:cTn id="1" dur="indefinite" restart="never" nodeType="tmRoot">
+          <p:childTnLst>
+            <p:seq concurrent="1" nextAc="seek">
+              <p:cTn id="2" dur="indefinite" nodeType="mainSeq">
+                <p:childTnLst>
+                  <p:par>
+                    <p:cTn id="3" fill="hold">
+                      <p:stCondLst>
+                        <p:cond delay="indefinite"/>
+                      </p:stCondLst>
+                      <p:childTnLst>
+                        <p:par>
+                          <p:cTn id="4" fill="hold">
+                            <p:stCondLst>
+                              <p:cond delay="0"/>
+                            </p:stCondLst>
+                            <p:childTnLst>
+                              <p:par>
+                                <p:cTn id="5" presetID="3" presetClass="entr" presetSubtype="10" fill="hold" nodeType="clickEffect">
+                                  <p:stCondLst>
+                                    <p:cond delay="0"/>
+                                  </p:stCondLst>
+                                  <p:childTnLst>
+                                    <p:set>
+                                      <p:cBhvr>
+                                        <p:cTn id="6" dur="1" fill="hold">
+                                          <p:stCondLst>
+                                            <p:cond delay="0"/>
+                                          </p:stCondLst>
+                                        </p:cTn>
+                                        <p:tgtEl>
+                                          <p:spTgt spid="3">
+                                            <p:txEl>
+                                              <p:pRg st="0" end="0"/>
+                                            </p:txEl>
+                                          </p:spTgt>
+                                        </p:tgtEl>
+                                        <p:attrNameLst>
+                                          <p:attrName>style.visibility</p:attrName>
+                                        </p:attrNameLst>
+                                      </p:cBhvr>
+                                      <p:to>
+                                        <p:strVal val="visible"/>
+                                      </p:to>
+                                    </p:set>
+                                    <p:animEffect transition="in" filter="blinds(horizontal)">
+                                      <p:cBhvr>
+                                        <p:cTn id="7" dur="500"/>
+                                        <p:tgtEl>
+                                          <p:spTgt spid="3">
+                                            <p:txEl>
+                                              <p:pRg st="0" end="0"/>
+                                            </p:txEl>
+                                          </p:spTgt>
+                                        </p:tgtEl>
+                                      </p:cBhvr>
+                                    </p:animEffect>
+                                  </p:childTnLst>
+                                </p:cTn>
+                              </p:par>
+                              <p:par>
+                                <p:cTn id="8" presetID="3" presetClass="entr" presetSubtype="10" fill="hold" nodeType="withEffect">
+                                  <p:stCondLst>
+                                    <p:cond delay="0"/>
+                                  </p:stCondLst>
+                                  <p:childTnLst>
+                                    <p:set>
+                                      <p:cBhvr>
+                                        <p:cTn id="9" dur="1" fill="hold">
+                                          <p:stCondLst>
+                                            <p:cond delay="0"/>
+                                          </p:stCondLst>
+                                        </p:cTn>
+                                        <p:tgtEl>
+                                          <p:spTgt spid="3">
+                                            <p:txEl>
+                                              <p:pRg st="1" end="1"/>
+                                            </p:txEl>
+                                          </p:spTgt>
+                                        </p:tgtEl>
+                                        <p:attrNameLst>
+                                          <p:attrName>style.visibility</p:attrName>
+                                        </p:attrNameLst>
+                                      </p:cBhvr>
+                                      <p:to>
+                                        <p:strVal val="visible"/>
+                                      </p:to>
+                                    </p:set>
+                                    <p:animEffect transition="in" filter="blinds(horizontal)">
+                                      <p:cBhvr>
+                                        <p:cTn id="10" dur="500"/>
+                                        <p:tgtEl>
+                                          <p:spTgt spid="3">
+                                            <p:txEl>
+                                              <p:pRg st="1" end="1"/>
+                                            </p:txEl>
+                                          </p:spTgt>
+                                        </p:tgtEl>
+                                      </p:cBhvr>
+                                    </p:animEffect>
+                                  </p:childTnLst>
+                                </p:cTn>
+                              </p:par>
+                            </p:childTnLst>
+                          </p:cTn>
+                        </p:par>
+                      </p:childTnLst>
+                    </p:cTn>
+                  </p:par>
+                  <p:par>
+                    <p:cTn id="11" fill="hold">
+                      <p:stCondLst>
+                        <p:cond delay="indefinite"/>
+                      </p:stCondLst>
+                      <p:childTnLst>
+                        <p:par>
+                          <p:cTn id="12" fill="hold">
+                            <p:stCondLst>
+                              <p:cond delay="0"/>
+                            </p:stCondLst>
+                            <p:childTnLst>
+                              <p:par>
+                                <p:cTn id="13" presetID="3" presetClass="entr" presetSubtype="10" fill="hold" nodeType="clickEffect">
+                                  <p:stCondLst>
+                                    <p:cond delay="0"/>
+                                  </p:stCondLst>
+                                  <p:childTnLst>
+                                    <p:set>
+                                      <p:cBhvr>
+                                        <p:cTn id="14" dur="1" fill="hold">
+                                          <p:stCondLst>
+                                            <p:cond delay="0"/>
+                                          </p:stCondLst>
+                                        </p:cTn>
+                                        <p:tgtEl>
+                                          <p:spTgt spid="3">
+                                            <p:txEl>
+                                              <p:pRg st="2" end="2"/>
+                                            </p:txEl>
+                                          </p:spTgt>
+                                        </p:tgtEl>
+                                        <p:attrNameLst>
+                                          <p:attrName>style.visibility</p:attrName>
+                                        </p:attrNameLst>
+                                      </p:cBhvr>
+                                      <p:to>
+                                        <p:strVal val="visible"/>
+                                      </p:to>
+                                    </p:set>
+                                    <p:animEffect transition="in" filter="blinds(horizontal)">
+                                      <p:cBhvr>
+                                        <p:cTn id="15" dur="500"/>
+                                        <p:tgtEl>
+                                          <p:spTgt spid="3">
+                                            <p:txEl>
+                                              <p:pRg st="2" end="2"/>
+                                            </p:txEl>
+                                          </p:spTgt>
+                                        </p:tgtEl>
+                                      </p:cBhvr>
+                                    </p:animEffect>
+                                  </p:childTnLst>
+                                </p:cTn>
+                              </p:par>
+                              <p:par>
+                                <p:cTn id="16" presetID="3" presetClass="entr" presetSubtype="10" fill="hold" nodeType="withEffect">
+                                  <p:stCondLst>
+                                    <p:cond delay="0"/>
+                                  </p:stCondLst>
+                                  <p:childTnLst>
+                                    <p:set>
+                                      <p:cBhvr>
+                                        <p:cTn id="17" dur="1" fill="hold">
+                                          <p:stCondLst>
+                                            <p:cond delay="0"/>
+                                          </p:stCondLst>
+                                        </p:cTn>
+                                        <p:tgtEl>
+                                          <p:spTgt spid="3">
+                                            <p:txEl>
+                                              <p:pRg st="3" end="3"/>
+                                            </p:txEl>
+                                          </p:spTgt>
+                                        </p:tgtEl>
+                                        <p:attrNameLst>
+                                          <p:attrName>style.visibility</p:attrName>
+                                        </p:attrNameLst>
+                                      </p:cBhvr>
+                                      <p:to>
+                                        <p:strVal val="visible"/>
+                                      </p:to>
+                                    </p:set>
+                                    <p:animEffect transition="in" filter="blinds(horizontal)">
+                                      <p:cBhvr>
+                                        <p:cTn id="18" dur="500"/>
+                                        <p:tgtEl>
+                                          <p:spTgt spid="3">
+                                            <p:txEl>
+                                              <p:pRg st="3" end="3"/>
+                                            </p:txEl>
+                                          </p:spTgt>
+                                        </p:tgtEl>
+                                      </p:cBhvr>
+                                    </p:animEffect>
+                                  </p:childTnLst>
+                                </p:cTn>
+                              </p:par>
+                            </p:childTnLst>
+                          </p:cTn>
+                        </p:par>
+                      </p:childTnLst>
+                    </p:cTn>
+                  </p:par>
+                  <p:par>
+                    <p:cTn id="19" fill="hold">
+                      <p:stCondLst>
+                        <p:cond delay="indefinite"/>
+                      </p:stCondLst>
+                      <p:childTnLst>
+                        <p:par>
+                          <p:cTn id="20" fill="hold">
+                            <p:stCondLst>
+                              <p:cond delay="0"/>
+                            </p:stCondLst>
+                            <p:childTnLst>
+                              <p:par>
+                                <p:cTn id="21" presetID="3" presetClass="entr" presetSubtype="10" fill="hold" nodeType="clickEffect">
+                                  <p:stCondLst>
+                                    <p:cond delay="0"/>
+                                  </p:stCondLst>
+                                  <p:childTnLst>
+                                    <p:set>
+                                      <p:cBhvr>
+                                        <p:cTn id="22" dur="1" fill="hold">
+                                          <p:stCondLst>
+                                            <p:cond delay="0"/>
+                                          </p:stCondLst>
+                                        </p:cTn>
+                                        <p:tgtEl>
+                                          <p:spTgt spid="3">
+                                            <p:txEl>
+                                              <p:pRg st="4" end="4"/>
+                                            </p:txEl>
+                                          </p:spTgt>
+                                        </p:tgtEl>
+                                        <p:attrNameLst>
+                                          <p:attrName>style.visibility</p:attrName>
+                                        </p:attrNameLst>
+                                      </p:cBhvr>
+                                      <p:to>
+                                        <p:strVal val="visible"/>
+                                      </p:to>
+                                    </p:set>
+                                    <p:animEffect transition="in" filter="blinds(horizontal)">
+                                      <p:cBhvr>
+                                        <p:cTn id="23" dur="500"/>
+                                        <p:tgtEl>
+                                          <p:spTgt spid="3">
+                                            <p:txEl>
+                                              <p:pRg st="4" end="4"/>
+                                            </p:txEl>
+                                          </p:spTgt>
+                                        </p:tgtEl>
+                                      </p:cBhvr>
+                                    </p:animEffect>
+                                  </p:childTnLst>
+                                </p:cTn>
+                              </p:par>
+                            </p:childTnLst>
+                          </p:cTn>
+                        </p:par>
+                      </p:childTnLst>
+                    </p:cTn>
+                  </p:par>
+                </p:childTnLst>
+              </p:cTn>
+              <p:prevCondLst>
+                <p:cond evt="onPrev" delay="0">
+                  <p:tgtEl>
+                    <p:sldTgt/>
+                  </p:tgtEl>
+                </p:cond>
+              </p:prevCondLst>
+              <p:nextCondLst>
+                <p:cond evt="onNext" delay="0">
+                  <p:tgtEl>
+                    <p:sldTgt/>
+                  </p:tgtEl>
+                </p:cond>
+              </p:nextCondLst>
+            </p:seq>
+          </p:childTnLst>
+        </p:cTn>
       </p:par>
     </p:tnLst>
   </p:timing>
@@ -10872,37 +12875,16 @@
             </a:pPr>
             <a:r>
               <a:rPr lang="en-US" sz="4000" dirty="0" smtClean="0"/>
-              <a:t>// </a:t>
-            </a:r>
+              <a:t>// cleans the build and deploy folder</a:t>
+            </a:r>
+          </a:p>
+          <a:p>
+            <a:pPr>
+              <a:buNone/>
+            </a:pPr>
             <a:r>
               <a:rPr lang="en-US" sz="4000" dirty="0" smtClean="0"/>
-              <a:t>cleans the </a:t>
-            </a:r>
-            <a:r>
-              <a:rPr lang="en-US" sz="4000" dirty="0" smtClean="0"/>
-              <a:t>build </a:t>
-            </a:r>
-            <a:r>
-              <a:rPr lang="en-US" sz="4000" dirty="0" smtClean="0"/>
-              <a:t>and deploy </a:t>
-            </a:r>
-            <a:r>
-              <a:rPr lang="en-US" sz="4000" dirty="0" smtClean="0"/>
-              <a:t>folder</a:t>
-            </a:r>
-            <a:endParaRPr lang="en-US" sz="4000" dirty="0" smtClean="0"/>
-          </a:p>
-          <a:p>
-            <a:pPr>
-              <a:buNone/>
-            </a:pPr>
-            <a:r>
-              <a:rPr lang="en-US" sz="4000" dirty="0" smtClean="0"/>
-              <a:t>Target “Clean” = (fun </a:t>
-            </a:r>
-            <a:r>
-              <a:rPr lang="en-US" sz="4000" dirty="0" smtClean="0"/>
-              <a:t>_ -&gt; </a:t>
+              <a:t>Target “Clean” (fun _ -&gt; </a:t>
             </a:r>
           </a:p>
           <a:p>
@@ -10936,11 +12918,7 @@
             </a:r>
             <a:r>
               <a:rPr lang="en-US" sz="4000" dirty="0" smtClean="0"/>
-              <a:t> "./deploy</a:t>
-            </a:r>
-            <a:r>
-              <a:rPr lang="en-US" sz="4000" dirty="0" smtClean="0"/>
-              <a:t>/“</a:t>
+              <a:t> "./deploy/“</a:t>
             </a:r>
           </a:p>
           <a:p>
@@ -10998,123 +12976,105 @@
         </p:nvSpPr>
         <p:spPr/>
         <p:txBody>
-          <a:bodyPr/>
-          <a:lstStyle/>
-          <a:p>
-            <a:r>
-              <a:rPr lang="de-DE" dirty="0" smtClean="0"/>
-              <a:t>Targets – </a:t>
-            </a:r>
-            <a:r>
-              <a:rPr lang="de-DE" dirty="0" err="1" smtClean="0"/>
-              <a:t>Using</a:t>
-            </a:r>
-            <a:r>
-              <a:rPr lang="de-DE" dirty="0" smtClean="0"/>
-              <a:t> </a:t>
-            </a:r>
-            <a:r>
-              <a:rPr lang="de-DE" dirty="0" err="1" smtClean="0"/>
-              <a:t>dynamic</a:t>
-            </a:r>
-            <a:r>
-              <a:rPr lang="de-DE" dirty="0" smtClean="0"/>
-              <a:t> Lookup</a:t>
-            </a:r>
-            <a:endParaRPr lang="de-DE" dirty="0"/>
-          </a:p>
-        </p:txBody>
-      </p:sp>
-      <p:sp>
-        <p:nvSpPr>
-          <p:cNvPr id="3" name="Inhaltsplatzhalter 2"/>
-          <p:cNvSpPr>
-            <a:spLocks noGrp="1"/>
-          </p:cNvSpPr>
-          <p:nvPr>
-            <p:ph idx="1"/>
-          </p:nvPr>
-        </p:nvSpPr>
-        <p:spPr/>
-        <p:txBody>
           <a:bodyPr>
             <a:normAutofit/>
           </a:bodyPr>
           <a:lstStyle/>
           <a:p>
+            <a:r>
+              <a:rPr lang="de-DE" dirty="0" err="1" smtClean="0"/>
+              <a:t>Dependencies</a:t>
+            </a:r>
+            <a:endParaRPr lang="de-DE" dirty="0"/>
+          </a:p>
+        </p:txBody>
+      </p:sp>
+      <p:sp>
+        <p:nvSpPr>
+          <p:cNvPr id="3" name="Inhaltsplatzhalter 2"/>
+          <p:cNvSpPr>
+            <a:spLocks noGrp="1"/>
+          </p:cNvSpPr>
+          <p:nvPr>
+            <p:ph idx="1"/>
+          </p:nvPr>
+        </p:nvSpPr>
+        <p:spPr/>
+        <p:txBody>
+          <a:bodyPr>
+            <a:normAutofit/>
+          </a:bodyPr>
+          <a:lstStyle/>
+          <a:p>
             <a:pPr>
               <a:buNone/>
             </a:pPr>
             <a:r>
-              <a:rPr lang="en-US" sz="4000" dirty="0" smtClean="0"/>
-              <a:t>// </a:t>
-            </a:r>
-            <a:r>
-              <a:rPr lang="en-US" sz="4000" dirty="0" smtClean="0"/>
-              <a:t>cleans the build and deploy </a:t>
-            </a:r>
-            <a:r>
-              <a:rPr lang="en-US" sz="4000" dirty="0" smtClean="0"/>
-              <a:t>folder </a:t>
-            </a:r>
-            <a:endParaRPr lang="en-US" sz="4000" dirty="0" smtClean="0"/>
+              <a:rPr lang="en-US" dirty="0" smtClean="0"/>
+              <a:t>" Test" &lt;== ["Clean";"</a:t>
+            </a:r>
+            <a:r>
+              <a:rPr lang="en-US" dirty="0" err="1"/>
+              <a:t>BuildApp</a:t>
+            </a:r>
+            <a:r>
+              <a:rPr lang="en-US" dirty="0"/>
+              <a:t>"</a:t>
+            </a:r>
+            <a:r>
+              <a:rPr lang="en-US" dirty="0" smtClean="0"/>
+              <a:t>; </a:t>
+            </a:r>
+            <a:r>
+              <a:rPr lang="en-US" dirty="0"/>
+              <a:t>"</a:t>
+            </a:r>
+            <a:r>
+              <a:rPr lang="en-US" dirty="0" err="1" smtClean="0"/>
+              <a:t>BuildTest</a:t>
+            </a:r>
+            <a:r>
+              <a:rPr lang="en-US" dirty="0" smtClean="0"/>
+              <a:t>"]</a:t>
+            </a:r>
+            <a:r>
+              <a:rPr lang="en-US" sz="3600" dirty="0" smtClean="0"/>
+              <a:t> </a:t>
+            </a:r>
           </a:p>
           <a:p>
             <a:pPr>
               <a:buNone/>
             </a:pPr>
-            <a:r>
-              <a:rPr lang="en-US" sz="4000" dirty="0" smtClean="0"/>
-              <a:t>Target? Clean &lt;- </a:t>
-            </a:r>
-          </a:p>
-          <a:p>
-            <a:pPr>
-              <a:buNone/>
-            </a:pPr>
-            <a:r>
-              <a:rPr lang="en-US" sz="4000" dirty="0" smtClean="0"/>
-              <a:t>    fun _ -&gt; </a:t>
-            </a:r>
-          </a:p>
-          <a:p>
-            <a:pPr>
-              <a:buNone/>
-            </a:pPr>
-            <a:r>
-              <a:rPr lang="en-US" sz="4000" dirty="0" smtClean="0"/>
-              <a:t>        </a:t>
-            </a:r>
-            <a:r>
-              <a:rPr lang="en-US" sz="4000" dirty="0" err="1" smtClean="0"/>
-              <a:t>CleanDir</a:t>
-            </a:r>
-            <a:r>
-              <a:rPr lang="en-US" sz="4000" dirty="0" smtClean="0"/>
-              <a:t> "./build/"</a:t>
-            </a:r>
-          </a:p>
-          <a:p>
-            <a:pPr>
-              <a:buNone/>
-            </a:pPr>
-            <a:r>
-              <a:rPr lang="en-US" sz="4000" dirty="0" smtClean="0"/>
-              <a:t>        </a:t>
-            </a:r>
-            <a:r>
-              <a:rPr lang="en-US" sz="4000" dirty="0" err="1" smtClean="0"/>
-              <a:t>CleanDir</a:t>
-            </a:r>
-            <a:r>
-              <a:rPr lang="en-US" sz="4000" dirty="0" smtClean="0"/>
-              <a:t> "./deploy</a:t>
-            </a:r>
-            <a:r>
-              <a:rPr lang="en-US" sz="4000" dirty="0" smtClean="0"/>
-              <a:t>/"</a:t>
-            </a:r>
-            <a:endParaRPr lang="en-US" sz="4000" dirty="0" smtClean="0"/>
+            <a:endParaRPr lang="en-US" sz="4800" dirty="0" smtClean="0"/>
+          </a:p>
+          <a:p>
+            <a:r>
+              <a:rPr lang="en-US" sz="4400" dirty="0" smtClean="0"/>
+              <a:t>We have to run </a:t>
+            </a:r>
+            <a:r>
+              <a:rPr lang="en-US" sz="4400" dirty="0" err="1" smtClean="0"/>
+              <a:t>Clean,BuildApp</a:t>
+            </a:r>
+            <a:r>
+              <a:rPr lang="en-US" sz="4400" dirty="0" smtClean="0"/>
+              <a:t> and </a:t>
+            </a:r>
+            <a:r>
+              <a:rPr lang="en-US" sz="4400" dirty="0" err="1" smtClean="0"/>
+              <a:t>BuildTest</a:t>
+            </a:r>
+            <a:r>
+              <a:rPr lang="en-US" sz="4400" dirty="0" smtClean="0"/>
+              <a:t> before Test</a:t>
+            </a:r>
+          </a:p>
+          <a:p>
+            <a:r>
+              <a:rPr lang="en-US" sz="4400" dirty="0" smtClean="0"/>
+              <a:t>Every target will be run at most once</a:t>
+            </a:r>
           </a:p>
         </p:txBody>
       </p:sp>
@@ -11162,16 +13122,14 @@
         </p:nvSpPr>
         <p:spPr/>
         <p:txBody>
-          <a:bodyPr>
-            <a:normAutofit/>
-          </a:bodyPr>
+          <a:bodyPr/>
           <a:lstStyle/>
           <a:p>
             <a:r>
-              <a:rPr lang="de-DE" dirty="0" err="1" smtClean="0"/>
-              <a:t>Dependencies</a:t>
-            </a:r>
-            <a:endParaRPr lang="de-DE" dirty="0"/>
+              <a:rPr lang="en-US" dirty="0" smtClean="0"/>
+              <a:t>Demo</a:t>
+            </a:r>
+            <a:endParaRPr lang="en-US" dirty="0"/>
           </a:p>
         </p:txBody>
       </p:sp>
@@ -11187,142 +13145,27 @@
         </p:nvSpPr>
         <p:spPr/>
         <p:txBody>
-          <a:bodyPr>
-            <a:normAutofit/>
-          </a:bodyPr>
+          <a:bodyPr/>
           <a:lstStyle/>
           <a:p>
-            <a:pPr>
-              <a:buNone/>
-            </a:pPr>
-            <a:r>
-              <a:rPr lang="de-DE" sz="4800" dirty="0" smtClean="0"/>
-              <a:t>„Test" </a:t>
-            </a:r>
-            <a:r>
-              <a:rPr lang="de-DE" sz="4800" dirty="0" smtClean="0"/>
-              <a:t>&lt;== ["Clean"; "</a:t>
-            </a:r>
-            <a:r>
-              <a:rPr lang="de-DE" sz="4800" dirty="0" err="1" smtClean="0"/>
-              <a:t>BuildApp</a:t>
-            </a:r>
-            <a:r>
-              <a:rPr lang="de-DE" sz="4800" dirty="0" smtClean="0"/>
-              <a:t>"] </a:t>
-            </a:r>
-            <a:endParaRPr lang="de-DE" sz="4800" dirty="0" smtClean="0"/>
-          </a:p>
-          <a:p>
-            <a:pPr>
-              <a:buNone/>
-            </a:pPr>
-            <a:endParaRPr lang="de-DE" sz="4800" dirty="0" smtClean="0"/>
-          </a:p>
-          <a:p>
-            <a:r>
-              <a:rPr lang="de-DE" sz="4400" dirty="0" err="1" smtClean="0"/>
-              <a:t>We</a:t>
-            </a:r>
-            <a:r>
-              <a:rPr lang="de-DE" sz="4400" dirty="0" smtClean="0"/>
-              <a:t> </a:t>
-            </a:r>
-            <a:r>
-              <a:rPr lang="de-DE" sz="4400" dirty="0" err="1" smtClean="0"/>
-              <a:t>have</a:t>
-            </a:r>
-            <a:r>
-              <a:rPr lang="de-DE" sz="4400" dirty="0" smtClean="0"/>
-              <a:t> </a:t>
-            </a:r>
-            <a:r>
-              <a:rPr lang="de-DE" sz="4400" dirty="0" err="1" smtClean="0"/>
-              <a:t>to</a:t>
-            </a:r>
-            <a:r>
-              <a:rPr lang="de-DE" sz="4400" dirty="0" smtClean="0"/>
-              <a:t> </a:t>
-            </a:r>
-            <a:r>
-              <a:rPr lang="de-DE" sz="4400" dirty="0" err="1" smtClean="0"/>
-              <a:t>run</a:t>
-            </a:r>
-            <a:r>
-              <a:rPr lang="de-DE" sz="4400" dirty="0" smtClean="0"/>
-              <a:t> Clean </a:t>
-            </a:r>
-            <a:r>
-              <a:rPr lang="de-DE" sz="4400" dirty="0" err="1" smtClean="0"/>
-              <a:t>and</a:t>
-            </a:r>
-            <a:r>
-              <a:rPr lang="de-DE" sz="4400" dirty="0" smtClean="0"/>
-              <a:t> </a:t>
-            </a:r>
-            <a:r>
-              <a:rPr lang="de-DE" sz="4400" dirty="0" err="1" smtClean="0"/>
-              <a:t>BuildApp</a:t>
-            </a:r>
-            <a:r>
-              <a:rPr lang="de-DE" sz="4400" dirty="0" smtClean="0"/>
-              <a:t> </a:t>
-            </a:r>
-            <a:r>
-              <a:rPr lang="de-DE" sz="4400" dirty="0" err="1" smtClean="0"/>
-              <a:t>before</a:t>
-            </a:r>
-            <a:r>
-              <a:rPr lang="de-DE" sz="4400" dirty="0" smtClean="0"/>
-              <a:t> Test</a:t>
-            </a:r>
-          </a:p>
-          <a:p>
-            <a:r>
-              <a:rPr lang="de-DE" sz="4400" dirty="0" smtClean="0"/>
-              <a:t>Every </a:t>
-            </a:r>
-            <a:r>
-              <a:rPr lang="de-DE" sz="4400" dirty="0" err="1" smtClean="0"/>
-              <a:t>target</a:t>
-            </a:r>
-            <a:r>
-              <a:rPr lang="de-DE" sz="4400" dirty="0" smtClean="0"/>
-              <a:t> </a:t>
-            </a:r>
-            <a:r>
-              <a:rPr lang="de-DE" sz="4400" dirty="0" err="1" smtClean="0"/>
-              <a:t>is</a:t>
-            </a:r>
-            <a:r>
-              <a:rPr lang="de-DE" sz="4400" dirty="0" smtClean="0"/>
-              <a:t> </a:t>
-            </a:r>
-            <a:r>
-              <a:rPr lang="de-DE" sz="4400" dirty="0" err="1" smtClean="0"/>
-              <a:t>only</a:t>
-            </a:r>
-            <a:r>
-              <a:rPr lang="de-DE" sz="4400" dirty="0" smtClean="0"/>
-              <a:t> </a:t>
-            </a:r>
-            <a:r>
-              <a:rPr lang="de-DE" sz="4400" dirty="0" err="1" smtClean="0"/>
-              <a:t>run</a:t>
-            </a:r>
-            <a:r>
-              <a:rPr lang="de-DE" sz="4400" dirty="0" smtClean="0"/>
-              <a:t> </a:t>
-            </a:r>
-            <a:r>
-              <a:rPr lang="de-DE" sz="4400" dirty="0" err="1" smtClean="0"/>
-              <a:t>once</a:t>
-            </a:r>
-            <a:endParaRPr lang="en-US" sz="4400" dirty="0" smtClean="0"/>
+            <a:r>
+              <a:rPr lang="en-US" dirty="0" err="1" smtClean="0"/>
+              <a:t>FooBar</a:t>
+            </a:r>
+            <a:r>
+              <a:rPr lang="en-US" dirty="0" smtClean="0"/>
+              <a:t> sample</a:t>
+            </a:r>
+            <a:endParaRPr lang="en-US" dirty="0" smtClean="0"/>
           </a:p>
         </p:txBody>
       </p:sp>
     </p:spTree>
+    <p:extLst>
+      <p:ext uri="{BB962C8B-B14F-4D97-AF65-F5344CB8AC3E}">
+        <p14:creationId xmlns:p14="http://schemas.microsoft.com/office/powerpoint/2010/main" val="2611755475"/>
+      </p:ext>
+    </p:extLst>
   </p:cSld>
   <p:clrMapOvr>
     <a:masterClrMapping/>
@@ -11366,66 +13209,56 @@
         </p:nvSpPr>
         <p:spPr/>
         <p:txBody>
+          <a:bodyPr/>
+          <a:lstStyle/>
+          <a:p>
+            <a:r>
+              <a:rPr lang="de-DE" dirty="0" smtClean="0"/>
+              <a:t>Targets – </a:t>
+            </a:r>
+            <a:r>
+              <a:rPr lang="de-DE" dirty="0" err="1" smtClean="0"/>
+              <a:t>Using</a:t>
+            </a:r>
+            <a:r>
+              <a:rPr lang="de-DE" dirty="0" smtClean="0"/>
+              <a:t> </a:t>
+            </a:r>
+            <a:r>
+              <a:rPr lang="de-DE" dirty="0" err="1" smtClean="0"/>
+              <a:t>dynamic</a:t>
+            </a:r>
+            <a:r>
+              <a:rPr lang="de-DE" dirty="0" smtClean="0"/>
+              <a:t> Lookup</a:t>
+            </a:r>
+            <a:endParaRPr lang="de-DE" dirty="0"/>
+          </a:p>
+        </p:txBody>
+      </p:sp>
+      <p:sp>
+        <p:nvSpPr>
+          <p:cNvPr id="3" name="Inhaltsplatzhalter 2"/>
+          <p:cNvSpPr>
+            <a:spLocks noGrp="1"/>
+          </p:cNvSpPr>
+          <p:nvPr>
+            <p:ph idx="1"/>
+          </p:nvPr>
+        </p:nvSpPr>
+        <p:spPr/>
+        <p:txBody>
           <a:bodyPr>
             <a:normAutofit/>
           </a:bodyPr>
           <a:lstStyle/>
           <a:p>
-            <a:r>
-              <a:rPr lang="de-DE" dirty="0" err="1" smtClean="0"/>
-              <a:t>Dependencies</a:t>
-            </a:r>
-            <a:r>
-              <a:rPr lang="de-DE" dirty="0" smtClean="0"/>
-              <a:t>– </a:t>
-            </a:r>
-            <a:r>
-              <a:rPr lang="de-DE" dirty="0" smtClean="0"/>
-              <a:t>Dynamic </a:t>
-            </a:r>
-            <a:r>
-              <a:rPr lang="de-DE" dirty="0" smtClean="0"/>
-              <a:t>Lookup</a:t>
-            </a:r>
-            <a:endParaRPr lang="de-DE" dirty="0"/>
-          </a:p>
-        </p:txBody>
-      </p:sp>
-      <p:sp>
-        <p:nvSpPr>
-          <p:cNvPr id="3" name="Inhaltsplatzhalter 2"/>
-          <p:cNvSpPr>
-            <a:spLocks noGrp="1"/>
-          </p:cNvSpPr>
-          <p:nvPr>
-            <p:ph idx="1"/>
-          </p:nvPr>
-        </p:nvSpPr>
-        <p:spPr/>
-        <p:txBody>
-          <a:bodyPr>
-            <a:normAutofit/>
-          </a:bodyPr>
-          <a:lstStyle/>
-          <a:p>
             <a:pPr>
               <a:buNone/>
             </a:pPr>
             <a:r>
-              <a:rPr lang="en-US" sz="4800" dirty="0" smtClean="0"/>
-              <a:t>For</a:t>
-            </a:r>
-            <a:r>
-              <a:rPr lang="en-US" sz="4800" dirty="0" smtClean="0"/>
-              <a:t>? </a:t>
-            </a:r>
-            <a:r>
-              <a:rPr lang="en-US" sz="4800" dirty="0" smtClean="0"/>
-              <a:t>Test </a:t>
-            </a:r>
-            <a:r>
-              <a:rPr lang="en-US" sz="4800" dirty="0" smtClean="0"/>
-              <a:t>&lt;-</a:t>
+              <a:rPr lang="en-US" sz="4000" dirty="0" smtClean="0"/>
+              <a:t>// cleans the build and deploy folder </a:t>
             </a:r>
           </a:p>
           <a:p>
@@ -11433,8 +13266,8 @@
               <a:buNone/>
             </a:pPr>
             <a:r>
-              <a:rPr lang="en-US" sz="4800" dirty="0" smtClean="0"/>
-              <a:t>    Dependency? Clean</a:t>
+              <a:rPr lang="en-US" sz="4000" dirty="0" smtClean="0"/>
+              <a:t>Target? Clean &lt;- </a:t>
             </a:r>
           </a:p>
           <a:p>
@@ -11442,22 +13275,64 @@
               <a:buNone/>
             </a:pPr>
             <a:r>
-              <a:rPr lang="en-US" sz="4800" dirty="0" smtClean="0"/>
-              <a:t>      </a:t>
-            </a:r>
-            <a:r>
-              <a:rPr lang="en-US" sz="4800" dirty="0" smtClean="0"/>
-              <a:t>      |&gt; </a:t>
-            </a:r>
-            <a:r>
-              <a:rPr lang="en-US" sz="4800" dirty="0" smtClean="0"/>
-              <a:t>And? </a:t>
-            </a:r>
-            <a:r>
-              <a:rPr lang="en-US" sz="4800" dirty="0" err="1" smtClean="0"/>
-              <a:t>BuildApp</a:t>
-            </a:r>
-            <a:endParaRPr lang="en-US" sz="4800" dirty="0" smtClean="0"/>
+              <a:rPr lang="en-US" sz="4000" dirty="0" smtClean="0"/>
+              <a:t>    fun _ -&gt; </a:t>
+            </a:r>
+          </a:p>
+          <a:p>
+            <a:pPr>
+              <a:buNone/>
+            </a:pPr>
+            <a:r>
+              <a:rPr lang="en-US" sz="4000" dirty="0" smtClean="0"/>
+              <a:t>        </a:t>
+            </a:r>
+            <a:r>
+              <a:rPr lang="en-US" sz="4000" dirty="0" err="1" smtClean="0"/>
+              <a:t>CleanDir</a:t>
+            </a:r>
+            <a:r>
+              <a:rPr lang="en-US" sz="4000" dirty="0" smtClean="0"/>
+              <a:t> "./build/"</a:t>
+            </a:r>
+          </a:p>
+          <a:p>
+            <a:pPr>
+              <a:buNone/>
+            </a:pPr>
+            <a:r>
+              <a:rPr lang="en-US" sz="4000" dirty="0" smtClean="0"/>
+              <a:t>        </a:t>
+            </a:r>
+            <a:r>
+              <a:rPr lang="en-US" sz="4000" dirty="0" err="1" smtClean="0"/>
+              <a:t>CleanDir</a:t>
+            </a:r>
+            <a:r>
+              <a:rPr lang="en-US" sz="4000" dirty="0" smtClean="0"/>
+              <a:t> "./deploy/“</a:t>
+            </a:r>
+          </a:p>
+          <a:p>
+            <a:pPr>
+              <a:buNone/>
+            </a:pPr>
+            <a:endParaRPr lang="en-US" sz="4000" dirty="0" smtClean="0"/>
+          </a:p>
+          <a:p>
+            <a:r>
+              <a:rPr lang="en-US" sz="4000" dirty="0" smtClean="0"/>
+              <a:t>Idea by </a:t>
+            </a:r>
+            <a:r>
+              <a:rPr lang="de-DE" sz="4000" dirty="0" smtClean="0"/>
+              <a:t>Jake </a:t>
+            </a:r>
+            <a:r>
+              <a:rPr lang="de-DE" sz="4000" dirty="0" err="1" smtClean="0"/>
+              <a:t>Swenson</a:t>
+            </a:r>
+            <a:endParaRPr lang="en-US" sz="4000" dirty="0" smtClean="0"/>
           </a:p>
         </p:txBody>
       </p:sp>
@@ -11505,12 +13380,18 @@
         </p:nvSpPr>
         <p:spPr/>
         <p:txBody>
-          <a:bodyPr/>
+          <a:bodyPr>
+            <a:normAutofit fontScale="90000"/>
+          </a:bodyPr>
           <a:lstStyle/>
           <a:p>
             <a:r>
               <a:rPr lang="de-DE" dirty="0" err="1" smtClean="0"/>
-              <a:t>NaturalSpec</a:t>
+              <a:t>Dependencies</a:t>
+            </a:r>
+            <a:r>
+              <a:rPr lang="de-DE" dirty="0" smtClean="0"/>
+              <a:t> – Dynamic Lookup</a:t>
             </a:r>
             <a:endParaRPr lang="de-DE" dirty="0"/>
           </a:p>
@@ -11528,106 +13409,59 @@
         </p:nvSpPr>
         <p:spPr/>
         <p:txBody>
-          <a:bodyPr/>
+          <a:bodyPr>
+            <a:normAutofit/>
+          </a:bodyPr>
           <a:lstStyle/>
           <a:p>
-            <a:r>
-              <a:rPr lang="en-US" dirty="0" smtClean="0"/>
-              <a:t>Domain-specific language for testing</a:t>
-            </a:r>
-          </a:p>
-          <a:p>
-            <a:pPr lvl="1"/>
-            <a:r>
-              <a:rPr lang="en-US" dirty="0" smtClean="0"/>
-              <a:t>AAA - Arrange, Act, Assert</a:t>
-            </a:r>
-          </a:p>
-          <a:p>
-            <a:r>
-              <a:rPr lang="en-US" dirty="0" smtClean="0"/>
-              <a:t>Embedded in F#</a:t>
-            </a:r>
-          </a:p>
-          <a:p>
-            <a:r>
-              <a:rPr lang="en-US" dirty="0" smtClean="0"/>
-              <a:t>Works </a:t>
-            </a:r>
-            <a:r>
-              <a:rPr lang="en-US" dirty="0" smtClean="0"/>
-              <a:t>with “FAKE – F# Make</a:t>
-            </a:r>
-            <a:r>
-              <a:rPr lang="en-US" dirty="0" smtClean="0"/>
-              <a:t>” ;-)</a:t>
-            </a:r>
-          </a:p>
-          <a:p>
-            <a:r>
-              <a:rPr lang="en-US" dirty="0" smtClean="0"/>
-              <a:t>Based on </a:t>
-            </a:r>
-            <a:r>
-              <a:rPr lang="en-US" dirty="0" err="1" smtClean="0"/>
-              <a:t>NUnit</a:t>
-            </a:r>
-            <a:endParaRPr lang="en-US" dirty="0" smtClean="0"/>
-          </a:p>
-          <a:p>
-            <a:r>
-              <a:rPr lang="en-US" dirty="0" smtClean="0"/>
-              <a:t>Works with all </a:t>
-            </a:r>
-            <a:r>
-              <a:rPr lang="en-US" dirty="0" err="1" smtClean="0"/>
-              <a:t>NUnit</a:t>
-            </a:r>
-            <a:r>
-              <a:rPr lang="en-US" dirty="0" smtClean="0"/>
-              <a:t> runners</a:t>
-            </a:r>
-          </a:p>
-          <a:p>
-            <a:pPr lvl="1"/>
-            <a:r>
-              <a:rPr lang="en-US" dirty="0" smtClean="0"/>
-              <a:t>Including </a:t>
-            </a:r>
-            <a:r>
-              <a:rPr lang="en-US" dirty="0" err="1" smtClean="0"/>
-              <a:t>Resharper</a:t>
-            </a:r>
-            <a:r>
-              <a:rPr lang="en-US" dirty="0" smtClean="0"/>
-              <a:t> </a:t>
-            </a:r>
-            <a:r>
-              <a:rPr lang="en-US" dirty="0" err="1" smtClean="0"/>
-              <a:t>UnitTest</a:t>
-            </a:r>
-            <a:r>
-              <a:rPr lang="en-US" dirty="0" smtClean="0"/>
-              <a:t> </a:t>
-            </a:r>
-            <a:r>
-              <a:rPr lang="en-US" dirty="0" smtClean="0"/>
-              <a:t>runner</a:t>
-            </a:r>
-          </a:p>
-          <a:p>
-            <a:pPr lvl="1"/>
-            <a:endParaRPr lang="en-US" dirty="0" smtClean="0"/>
-          </a:p>
-          <a:p>
-            <a:r>
-              <a:rPr lang="en-US" dirty="0" smtClean="0"/>
-              <a:t>http://bitbucket.org/forki/naturalspec</a:t>
-            </a:r>
-            <a:endParaRPr lang="en-US" dirty="0" smtClean="0"/>
-          </a:p>
-          <a:p>
-            <a:endParaRPr lang="de-DE" dirty="0" smtClean="0"/>
+            <a:pPr>
+              <a:buNone/>
+            </a:pPr>
+            <a:r>
+              <a:rPr lang="en-US" sz="4800" dirty="0" smtClean="0"/>
+              <a:t>For? Test &lt;-</a:t>
+            </a:r>
+          </a:p>
+          <a:p>
+            <a:pPr>
+              <a:buNone/>
+            </a:pPr>
+            <a:r>
+              <a:rPr lang="en-US" sz="4800" dirty="0" smtClean="0"/>
+              <a:t>    Dependency? Clean</a:t>
+            </a:r>
+          </a:p>
+          <a:p>
+            <a:pPr>
+              <a:buNone/>
+            </a:pPr>
+            <a:r>
+              <a:rPr lang="en-US" sz="4800" dirty="0" smtClean="0"/>
+              <a:t>            |&gt; And? </a:t>
+            </a:r>
+            <a:r>
+              <a:rPr lang="en-US" sz="4800" dirty="0" err="1" smtClean="0"/>
+              <a:t>BuildApp</a:t>
+            </a:r>
+            <a:endParaRPr lang="en-US" sz="4800" dirty="0" smtClean="0"/>
+          </a:p>
+          <a:p>
+            <a:pPr>
+              <a:buNone/>
+            </a:pPr>
+            <a:r>
+              <a:rPr lang="en-US" sz="4800" dirty="0" smtClean="0"/>
+              <a:t>            </a:t>
+            </a:r>
+            <a:r>
+              <a:rPr lang="en-US" sz="4800" dirty="0"/>
+              <a:t>|&gt; And? </a:t>
+            </a:r>
+            <a:r>
+              <a:rPr lang="en-US" sz="4800" dirty="0" err="1" smtClean="0"/>
+              <a:t>BuildTest</a:t>
+            </a:r>
+            <a:endParaRPr lang="en-US" sz="4800" dirty="0" smtClean="0"/>
           </a:p>
         </p:txBody>
       </p:sp>

</xml_diff>